<commit_message>
added slides for pipeline step 3
</commit_message>
<xml_diff>
--- a/presentation/20180713 Gruppe 5.pptx
+++ b/presentation/20180713 Gruppe 5.pptx
@@ -5,10 +5,10 @@
     <p:sldMasterId id="2147483648" r:id="rId1"/>
   </p:sldMasterIdLst>
   <p:notesMasterIdLst>
-    <p:notesMasterId r:id="rId15"/>
+    <p:notesMasterId r:id="rId20"/>
   </p:notesMasterIdLst>
   <p:handoutMasterIdLst>
-    <p:handoutMasterId r:id="rId16"/>
+    <p:handoutMasterId r:id="rId21"/>
   </p:handoutMasterIdLst>
   <p:sldIdLst>
     <p:sldId id="256" r:id="rId2"/>
@@ -20,10 +20,15 @@
     <p:sldId id="262" r:id="rId8"/>
     <p:sldId id="263" r:id="rId9"/>
     <p:sldId id="266" r:id="rId10"/>
-    <p:sldId id="267" r:id="rId11"/>
-    <p:sldId id="264" r:id="rId12"/>
-    <p:sldId id="265" r:id="rId13"/>
-    <p:sldId id="268" r:id="rId14"/>
+    <p:sldId id="272" r:id="rId11"/>
+    <p:sldId id="269" r:id="rId12"/>
+    <p:sldId id="273" r:id="rId13"/>
+    <p:sldId id="274" r:id="rId14"/>
+    <p:sldId id="275" r:id="rId15"/>
+    <p:sldId id="271" r:id="rId16"/>
+    <p:sldId id="264" r:id="rId17"/>
+    <p:sldId id="265" r:id="rId18"/>
+    <p:sldId id="268" r:id="rId19"/>
   </p:sldIdLst>
   <p:sldSz cx="9144000" cy="6858000" type="screen4x3"/>
   <p:notesSz cx="6858000" cy="9144000"/>
@@ -154,7 +159,7 @@
   </p:defaultTextStyle>
   <p:extLst>
     <p:ext uri="{EFAFB233-063F-42B5-8137-9DF3F51BA10A}">
-      <p15:sldGuideLst xmlns:p15="http://schemas.microsoft.com/office/powerpoint/2012/main">
+      <p15:sldGuideLst xmlns:p15="http://schemas.microsoft.com/office/powerpoint/2012/main" xmlns="">
         <p15:guide id="1" orient="horz" pos="2160">
           <p15:clr>
             <a:srgbClr val="A4A3A4"/>
@@ -168,7 +173,7 @@
       </p15:sldGuideLst>
     </p:ext>
     <p:ext uri="{2D200454-40CA-4A62-9FC3-DE9A4176ACB9}">
-      <p15:notesGuideLst xmlns:p15="http://schemas.microsoft.com/office/powerpoint/2012/main"/>
+      <p15:notesGuideLst xmlns:p15="http://schemas.microsoft.com/office/powerpoint/2012/main" xmlns=""/>
     </p:ext>
   </p:extLst>
 </p:presentation>
@@ -568,7 +573,7 @@
     </p:spTree>
     <p:extLst>
       <p:ext uri="{BB962C8B-B14F-4D97-AF65-F5344CB8AC3E}">
-        <p14:creationId xmlns:p14="http://schemas.microsoft.com/office/powerpoint/2010/main" val="3345007041"/>
+        <p14:creationId xmlns:p14="http://schemas.microsoft.com/office/powerpoint/2010/main" xmlns="" val="3345007041"/>
       </p:ext>
     </p:extLst>
   </p:cSld>
@@ -1107,7 +1112,7 @@
     </p:spTree>
     <p:extLst>
       <p:ext uri="{BB962C8B-B14F-4D97-AF65-F5344CB8AC3E}">
-        <p14:creationId xmlns:p14="http://schemas.microsoft.com/office/powerpoint/2010/main" val="516787406"/>
+        <p14:creationId xmlns:p14="http://schemas.microsoft.com/office/powerpoint/2010/main" xmlns="" val="516787406"/>
       </p:ext>
     </p:extLst>
   </p:cSld>
@@ -1238,6 +1243,144 @@
 </p:notesMaster>
 </file>
 
+<file path=ppt/notesSlides/notesSlide1.xml><?xml version="1.0" encoding="utf-8"?>
+<p:notes xmlns:a="http://schemas.openxmlformats.org/drawingml/2006/main" xmlns:r="http://schemas.openxmlformats.org/officeDocument/2006/relationships" xmlns:p="http://schemas.openxmlformats.org/presentationml/2006/main">
+  <p:cSld>
+    <p:spTree>
+      <p:nvGrpSpPr>
+        <p:cNvPr id="1" name=""/>
+        <p:cNvGrpSpPr/>
+        <p:nvPr/>
+      </p:nvGrpSpPr>
+      <p:grpSpPr>
+        <a:xfrm>
+          <a:off x="0" y="0"/>
+          <a:ext cx="0" cy="0"/>
+          <a:chOff x="0" y="0"/>
+          <a:chExt cx="0" cy="0"/>
+        </a:xfrm>
+      </p:grpSpPr>
+      <p:sp>
+        <p:nvSpPr>
+          <p:cNvPr id="2" name="Folienbildplatzhalter 1"/>
+          <p:cNvSpPr>
+            <a:spLocks noGrp="1" noRot="1" noChangeAspect="1"/>
+          </p:cNvSpPr>
+          <p:nvPr>
+            <p:ph type="sldImg"/>
+          </p:nvPr>
+        </p:nvSpPr>
+        <p:spPr>
+          <a:xfrm>
+            <a:off x="1371600" y="923925"/>
+            <a:ext cx="4095750" cy="3071813"/>
+          </a:xfrm>
+        </p:spPr>
+      </p:sp>
+      <p:sp>
+        <p:nvSpPr>
+          <p:cNvPr id="3" name="Notizenplatzhalter 2"/>
+          <p:cNvSpPr>
+            <a:spLocks noGrp="1"/>
+          </p:cNvSpPr>
+          <p:nvPr>
+            <p:ph type="body" idx="1"/>
+          </p:nvPr>
+        </p:nvSpPr>
+        <p:spPr/>
+        <p:txBody>
+          <a:bodyPr>
+            <a:normAutofit/>
+          </a:bodyPr>
+          <a:lstStyle/>
+          <a:p>
+            <a:endParaRPr lang="de-DE" dirty="0"/>
+          </a:p>
+        </p:txBody>
+      </p:sp>
+      <p:sp>
+        <p:nvSpPr>
+          <p:cNvPr id="4" name="Datumsplatzhalter 3"/>
+          <p:cNvSpPr>
+            <a:spLocks noGrp="1"/>
+          </p:cNvSpPr>
+          <p:nvPr>
+            <p:ph type="dt" idx="10"/>
+          </p:nvPr>
+        </p:nvSpPr>
+        <p:spPr/>
+        <p:txBody>
+          <a:bodyPr/>
+          <a:lstStyle/>
+          <a:p>
+            <a:fld id="{065B079B-E513-489A-8A1B-D7C78493EA86}" type="datetime4">
+              <a:rPr lang="de-DE" smtClean="0"/>
+              <a:pPr/>
+              <a:t>9. Juli 2018</a:t>
+            </a:fld>
+            <a:endParaRPr lang="de-DE"/>
+          </a:p>
+        </p:txBody>
+      </p:sp>
+      <p:sp>
+        <p:nvSpPr>
+          <p:cNvPr id="5" name="Fußzeilenplatzhalter 4"/>
+          <p:cNvSpPr>
+            <a:spLocks noGrp="1"/>
+          </p:cNvSpPr>
+          <p:nvPr>
+            <p:ph type="ftr" sz="quarter" idx="11"/>
+          </p:nvPr>
+        </p:nvSpPr>
+        <p:spPr/>
+        <p:txBody>
+          <a:bodyPr/>
+          <a:lstStyle/>
+          <a:p>
+            <a:r>
+              <a:rPr lang="de-DE" smtClean="0"/>
+              <a:t>|  </a:t>
+            </a:r>
+            <a:endParaRPr lang="de-DE"/>
+          </a:p>
+        </p:txBody>
+      </p:sp>
+      <p:sp>
+        <p:nvSpPr>
+          <p:cNvPr id="6" name="Foliennummernplatzhalter 5"/>
+          <p:cNvSpPr>
+            <a:spLocks noGrp="1"/>
+          </p:cNvSpPr>
+          <p:nvPr>
+            <p:ph type="sldNum" sz="quarter" idx="12"/>
+          </p:nvPr>
+        </p:nvSpPr>
+        <p:spPr/>
+        <p:txBody>
+          <a:bodyPr/>
+          <a:lstStyle/>
+          <a:p>
+            <a:r>
+              <a:rPr lang="de-DE" smtClean="0"/>
+              <a:t>|  </a:t>
+            </a:r>
+            <a:fld id="{C36AA9A4-5D0B-4134-89A6-D8B9DAA4F25C}" type="slidenum">
+              <a:rPr lang="de-DE" smtClean="0"/>
+              <a:pPr/>
+              <a:t>1</a:t>
+            </a:fld>
+            <a:endParaRPr lang="de-DE"/>
+          </a:p>
+        </p:txBody>
+      </p:sp>
+    </p:spTree>
+  </p:cSld>
+  <p:clrMapOvr>
+    <a:masterClrMapping/>
+  </p:clrMapOvr>
+</p:notes>
+</file>
+
 <file path=ppt/slideLayouts/slideLayout1.xml><?xml version="1.0" encoding="utf-8"?>
 <p:sldLayout xmlns:a="http://schemas.openxmlformats.org/drawingml/2006/main" xmlns:r="http://schemas.openxmlformats.org/officeDocument/2006/relationships" xmlns:p="http://schemas.openxmlformats.org/presentationml/2006/main" showMasterSp="0" preserve="1" userDrawn="1">
   <p:cSld name="Titelfolie">
@@ -1709,7 +1852,7 @@
           <p:cNvPr id="13" name="Picture 2" descr="small ke-icon">
             <a:extLst>
               <a:ext uri="{FF2B5EF4-FFF2-40B4-BE49-F238E27FC236}">
-                <a16:creationId xmlns:a16="http://schemas.microsoft.com/office/drawing/2014/main" id="{83854E58-1482-478C-955E-C8509C8684B6}"/>
+                <a16:creationId xmlns:a16="http://schemas.microsoft.com/office/drawing/2014/main" xmlns="" id="{83854E58-1482-478C-955E-C8509C8684B6}"/>
               </a:ext>
             </a:extLst>
           </p:cNvPr>
@@ -1719,10 +1862,10 @@
           <p:nvPr userDrawn="1"/>
         </p:nvPicPr>
         <p:blipFill>
-          <a:blip r:embed="rId3">
+          <a:blip r:embed="rId3" cstate="print">
             <a:extLst>
               <a:ext uri="{28A0092B-C50C-407E-A947-70E740481C1C}">
-                <a14:useLocalDpi xmlns:a14="http://schemas.microsoft.com/office/drawing/2010/main" val="0"/>
+                <a14:useLocalDpi xmlns:a14="http://schemas.microsoft.com/office/drawing/2010/main" xmlns="" val="0"/>
               </a:ext>
             </a:extLst>
           </a:blip>
@@ -1742,7 +1885,7 @@
           <a:noFill/>
           <a:extLst>
             <a:ext uri="{909E8E84-426E-40DD-AFC4-6F175D3DCCD1}">
-              <a14:hiddenFill xmlns:a14="http://schemas.microsoft.com/office/drawing/2010/main">
+              <a14:hiddenFill xmlns:a14="http://schemas.microsoft.com/office/drawing/2010/main" xmlns="">
                 <a:solidFill>
                   <a:srgbClr val="FFFFFF"/>
                 </a:solidFill>
@@ -3223,7 +3366,7 @@
           <p:cNvPr id="2" name="Picture 2" descr="small ke-icon">
             <a:extLst>
               <a:ext uri="{FF2B5EF4-FFF2-40B4-BE49-F238E27FC236}">
-                <a16:creationId xmlns:a16="http://schemas.microsoft.com/office/drawing/2014/main" id="{2CEB455C-E142-47B5-A2EA-F103D223A10D}"/>
+                <a16:creationId xmlns:a16="http://schemas.microsoft.com/office/drawing/2014/main" xmlns="" id="{2CEB455C-E142-47B5-A2EA-F103D223A10D}"/>
               </a:ext>
             </a:extLst>
           </p:cNvPr>
@@ -3233,10 +3376,10 @@
           <p:nvPr userDrawn="1"/>
         </p:nvPicPr>
         <p:blipFill>
-          <a:blip r:embed="rId11">
+          <a:blip r:embed="rId11" cstate="print">
             <a:extLst>
               <a:ext uri="{28A0092B-C50C-407E-A947-70E740481C1C}">
-                <a14:useLocalDpi xmlns:a14="http://schemas.microsoft.com/office/drawing/2010/main" val="0"/>
+                <a14:useLocalDpi xmlns:a14="http://schemas.microsoft.com/office/drawing/2010/main" xmlns="" val="0"/>
               </a:ext>
             </a:extLst>
           </a:blip>
@@ -3256,7 +3399,7 @@
           <a:noFill/>
           <a:extLst>
             <a:ext uri="{909E8E84-426E-40DD-AFC4-6F175D3DCCD1}">
-              <a14:hiddenFill xmlns:a14="http://schemas.microsoft.com/office/drawing/2010/main">
+              <a14:hiddenFill xmlns:a14="http://schemas.microsoft.com/office/drawing/2010/main" xmlns="">
                 <a:solidFill>
                   <a:srgbClr val="FFFFFF"/>
                 </a:solidFill>
@@ -3742,16 +3885,16 @@
           <a:lstStyle/>
           <a:p>
             <a:r>
-              <a:rPr lang="de-DE" dirty="0" err="1"/>
-              <a:t>Au­to­mat­ic</a:t>
+              <a:rPr lang="de-DE" dirty="0" smtClean="0"/>
+              <a:t>Automatic </a:t>
             </a:r>
             <a:r>
               <a:rPr lang="de-DE" dirty="0"/>
-              <a:t> Text </a:t>
-            </a:r>
-            <a:r>
-              <a:rPr lang="de-DE" dirty="0" err="1"/>
-              <a:t>Sum­ma­riza­tion</a:t>
+              <a:t>Text </a:t>
+            </a:r>
+            <a:r>
+              <a:rPr lang="de-DE" dirty="0" err="1" smtClean="0"/>
+              <a:t>Summarization</a:t>
             </a:r>
             <a:endParaRPr lang="de-DE" dirty="0"/>
           </a:p>
@@ -3762,7 +3905,7 @@
           <p:cNvPr id="2052" name="Picture 4" descr="http://www.ke.tu-darmstadt.de/ke_site_header.jpg">
             <a:extLst>
               <a:ext uri="{FF2B5EF4-FFF2-40B4-BE49-F238E27FC236}">
-                <a16:creationId xmlns:a16="http://schemas.microsoft.com/office/drawing/2014/main" id="{A4296F2A-DF52-4654-B393-FD38D561FC7C}"/>
+                <a16:creationId xmlns:a16="http://schemas.microsoft.com/office/drawing/2014/main" xmlns="" id="{A4296F2A-DF52-4654-B393-FD38D561FC7C}"/>
               </a:ext>
             </a:extLst>
           </p:cNvPr>
@@ -3772,10 +3915,10 @@
           <p:nvPr/>
         </p:nvPicPr>
         <p:blipFill>
-          <a:blip r:embed="rId2">
+          <a:blip r:embed="rId3" cstate="print">
             <a:extLst>
               <a:ext uri="{28A0092B-C50C-407E-A947-70E740481C1C}">
-                <a14:useLocalDpi xmlns:a14="http://schemas.microsoft.com/office/drawing/2010/main" val="0"/>
+                <a14:useLocalDpi xmlns:a14="http://schemas.microsoft.com/office/drawing/2010/main" xmlns="" val="0"/>
               </a:ext>
             </a:extLst>
           </a:blip>
@@ -3795,7 +3938,7 @@
           <a:noFill/>
           <a:extLst>
             <a:ext uri="{909E8E84-426E-40DD-AFC4-6F175D3DCCD1}">
-              <a14:hiddenFill xmlns:a14="http://schemas.microsoft.com/office/drawing/2010/main">
+              <a14:hiddenFill xmlns:a14="http://schemas.microsoft.com/office/drawing/2010/main" xmlns="">
                 <a:solidFill>
                   <a:srgbClr val="FFFFFF"/>
                 </a:solidFill>
@@ -3809,6 +3952,13 @@
   <p:clrMapOvr>
     <a:masterClrMapping/>
   </p:clrMapOvr>
+  <p:timing>
+    <p:tnLst>
+      <p:par>
+        <p:cTn id="1" dur="indefinite" restart="never" nodeType="tmRoot"/>
+      </p:par>
+    </p:tnLst>
+  </p:timing>
 </p:sld>
 </file>
 
@@ -3834,7 +3984,7 @@
           <p:cNvPr id="2" name="Titel 1">
             <a:extLst>
               <a:ext uri="{FF2B5EF4-FFF2-40B4-BE49-F238E27FC236}">
-                <a16:creationId xmlns:a16="http://schemas.microsoft.com/office/drawing/2014/main" id="{594F37A0-8FD9-42A4-A80F-4C479182787E}"/>
+                <a16:creationId xmlns:a16="http://schemas.microsoft.com/office/drawing/2014/main" xmlns="" id="{594F37A0-8FD9-42A4-A80F-4C479182787E}"/>
               </a:ext>
             </a:extLst>
           </p:cNvPr>
@@ -3851,13 +4001,10 @@
           <a:lstStyle/>
           <a:p>
             <a:r>
-              <a:rPr lang="de-DE" dirty="0" err="1"/>
-              <a:t>Step</a:t>
-            </a:r>
-            <a:r>
-              <a:rPr lang="de-DE" dirty="0"/>
-              <a:t> 3</a:t>
-            </a:r>
+              <a:rPr lang="en-US" dirty="0" smtClean="0"/>
+              <a:t>Step 3 – Creating summaries from hierarchies</a:t>
+            </a:r>
+            <a:endParaRPr lang="en-US" dirty="0"/>
           </a:p>
         </p:txBody>
       </p:sp>
@@ -3866,7 +4013,7 @@
           <p:cNvPr id="3" name="Inhaltsplatzhalter 2">
             <a:extLst>
               <a:ext uri="{FF2B5EF4-FFF2-40B4-BE49-F238E27FC236}">
-                <a16:creationId xmlns:a16="http://schemas.microsoft.com/office/drawing/2014/main" id="{B201CE33-F1D7-423B-B373-1D449812B3D5}"/>
+                <a16:creationId xmlns:a16="http://schemas.microsoft.com/office/drawing/2014/main" xmlns="" id="{B201CE33-F1D7-423B-B373-1D449812B3D5}"/>
               </a:ext>
             </a:extLst>
           </p:cNvPr>
@@ -3882,34 +4029,10 @@
           <a:bodyPr/>
           <a:lstStyle/>
           <a:p>
-            <a:r>
-              <a:rPr lang="de-DE" dirty="0" err="1"/>
-              <a:t>select</a:t>
-            </a:r>
-            <a:r>
-              <a:rPr lang="de-DE" dirty="0"/>
-              <a:t> </a:t>
-            </a:r>
-            <a:r>
-              <a:rPr lang="de-DE" dirty="0" err="1"/>
-              <a:t>nuggets</a:t>
-            </a:r>
-            <a:r>
-              <a:rPr lang="de-DE" dirty="0"/>
-              <a:t> </a:t>
-            </a:r>
-            <a:r>
-              <a:rPr lang="de-DE" dirty="0" err="1"/>
-              <a:t>for</a:t>
-            </a:r>
-            <a:r>
-              <a:rPr lang="de-DE" dirty="0"/>
-              <a:t> final </a:t>
-            </a:r>
-            <a:r>
-              <a:rPr lang="de-DE" dirty="0" err="1"/>
-              <a:t>summary</a:t>
-            </a:r>
+            <a:pPr>
+              <a:buFont typeface="Arial" pitchFamily="34" charset="0"/>
+              <a:buChar char="•"/>
+            </a:pPr>
             <a:endParaRPr lang="de-DE" dirty="0"/>
           </a:p>
         </p:txBody>
@@ -3919,12 +4042,12 @@
           <p:cNvPr id="5" name="Pfeil: Chevron 4">
             <a:extLst>
               <a:ext uri="{FF2B5EF4-FFF2-40B4-BE49-F238E27FC236}">
-                <a16:creationId xmlns:a16="http://schemas.microsoft.com/office/drawing/2014/main" id="{FE16A436-3EBF-406A-A452-2785E92CA870}"/>
+                <a16:creationId xmlns:a16="http://schemas.microsoft.com/office/drawing/2014/main" xmlns="" id="{FE16A436-3EBF-406A-A452-2785E92CA870}"/>
               </a:ext>
             </a:extLst>
           </p:cNvPr>
           <p:cNvSpPr/>
-          <p:nvPr userDrawn="1"/>
+          <p:nvPr/>
         </p:nvSpPr>
         <p:spPr>
           <a:xfrm>
@@ -3989,12 +4112,12 @@
           <p:cNvPr id="6" name="Pfeil: Chevron 5">
             <a:extLst>
               <a:ext uri="{FF2B5EF4-FFF2-40B4-BE49-F238E27FC236}">
-                <a16:creationId xmlns:a16="http://schemas.microsoft.com/office/drawing/2014/main" id="{4B425B4C-53B0-4FDA-90C8-3EAE519EFFB2}"/>
+                <a16:creationId xmlns:a16="http://schemas.microsoft.com/office/drawing/2014/main" xmlns="" id="{4B425B4C-53B0-4FDA-90C8-3EAE519EFFB2}"/>
               </a:ext>
             </a:extLst>
           </p:cNvPr>
           <p:cNvSpPr/>
-          <p:nvPr userDrawn="1"/>
+          <p:nvPr/>
         </p:nvSpPr>
         <p:spPr>
           <a:xfrm>
@@ -4055,12 +4178,12 @@
           <p:cNvPr id="7" name="Pfeil: Chevron 6">
             <a:extLst>
               <a:ext uri="{FF2B5EF4-FFF2-40B4-BE49-F238E27FC236}">
-                <a16:creationId xmlns:a16="http://schemas.microsoft.com/office/drawing/2014/main" id="{14F5353B-3EA0-4F48-A473-08D522F34D71}"/>
+                <a16:creationId xmlns:a16="http://schemas.microsoft.com/office/drawing/2014/main" xmlns="" id="{14F5353B-3EA0-4F48-A473-08D522F34D71}"/>
               </a:ext>
             </a:extLst>
           </p:cNvPr>
           <p:cNvSpPr/>
-          <p:nvPr userDrawn="1"/>
+          <p:nvPr/>
         </p:nvSpPr>
         <p:spPr>
           <a:xfrm>
@@ -4132,12 +4255,12 @@
           <p:cNvPr id="8" name="Pfeil: Chevron 7">
             <a:extLst>
               <a:ext uri="{FF2B5EF4-FFF2-40B4-BE49-F238E27FC236}">
-                <a16:creationId xmlns:a16="http://schemas.microsoft.com/office/drawing/2014/main" id="{655E865C-680E-47F4-9F87-B4EB179E321D}"/>
+                <a16:creationId xmlns:a16="http://schemas.microsoft.com/office/drawing/2014/main" xmlns="" id="{655E865C-680E-47F4-9F87-B4EB179E321D}"/>
               </a:ext>
             </a:extLst>
           </p:cNvPr>
           <p:cNvSpPr/>
-          <p:nvPr userDrawn="1"/>
+          <p:nvPr/>
         </p:nvSpPr>
         <p:spPr>
           <a:xfrm>
@@ -4197,16 +4320,47 @@
           </a:p>
         </p:txBody>
       </p:sp>
+      <p:pic>
+        <p:nvPicPr>
+          <p:cNvPr id="12" name="Grafik 11" descr="AutoTS__Praesentation_Beispielgraph_2_mit_Auswahl.png"/>
+          <p:cNvPicPr>
+            <a:picLocks noChangeAspect="1"/>
+          </p:cNvPicPr>
+          <p:nvPr/>
+        </p:nvPicPr>
+        <p:blipFill>
+          <a:blip r:embed="rId2" cstate="print"/>
+          <a:stretch>
+            <a:fillRect/>
+          </a:stretch>
+        </p:blipFill>
+        <p:spPr>
+          <a:xfrm>
+            <a:off x="1151620" y="2420889"/>
+            <a:ext cx="6840759" cy="3758268"/>
+          </a:xfrm>
+          <a:prstGeom prst="rect">
+            <a:avLst/>
+          </a:prstGeom>
+        </p:spPr>
+      </p:pic>
     </p:spTree>
     <p:extLst>
       <p:ext uri="{BB962C8B-B14F-4D97-AF65-F5344CB8AC3E}">
-        <p14:creationId xmlns:p14="http://schemas.microsoft.com/office/powerpoint/2010/main" val="3359108963"/>
+        <p14:creationId xmlns:p14="http://schemas.microsoft.com/office/powerpoint/2010/main" xmlns="" val="3359108963"/>
       </p:ext>
     </p:extLst>
   </p:cSld>
   <p:clrMapOvr>
     <a:masterClrMapping/>
   </p:clrMapOvr>
+  <p:timing>
+    <p:tnLst>
+      <p:par>
+        <p:cTn id="1" dur="indefinite" restart="never" nodeType="tmRoot"/>
+      </p:par>
+    </p:tnLst>
+  </p:timing>
 </p:sld>
 </file>
 
@@ -4232,7 +4386,7 @@
           <p:cNvPr id="2" name="Titel 1">
             <a:extLst>
               <a:ext uri="{FF2B5EF4-FFF2-40B4-BE49-F238E27FC236}">
-                <a16:creationId xmlns:a16="http://schemas.microsoft.com/office/drawing/2014/main" id="{ECD13983-53CB-41A8-9897-E4D20881F929}"/>
+                <a16:creationId xmlns:a16="http://schemas.microsoft.com/office/drawing/2014/main" xmlns="" id="{594F37A0-8FD9-42A4-A80F-4C479182787E}"/>
               </a:ext>
             </a:extLst>
           </p:cNvPr>
@@ -4249,94 +4403,10 @@
           <a:lstStyle/>
           <a:p>
             <a:r>
-              <a:rPr lang="de-DE" dirty="0" err="1"/>
-              <a:t>Result</a:t>
-            </a:r>
-            <a:endParaRPr lang="de-DE" dirty="0"/>
-          </a:p>
-        </p:txBody>
-      </p:sp>
-      <p:sp>
-        <p:nvSpPr>
-          <p:cNvPr id="3" name="Textplatzhalter 2">
-            <a:extLst>
-              <a:ext uri="{FF2B5EF4-FFF2-40B4-BE49-F238E27FC236}">
-                <a16:creationId xmlns:a16="http://schemas.microsoft.com/office/drawing/2014/main" id="{8A82E612-E974-4DE0-823F-A661C5C288BB}"/>
-              </a:ext>
-            </a:extLst>
-          </p:cNvPr>
-          <p:cNvSpPr>
-            <a:spLocks noGrp="1"/>
-          </p:cNvSpPr>
-          <p:nvPr>
-            <p:ph type="body" idx="1"/>
-          </p:nvPr>
-        </p:nvSpPr>
-        <p:spPr/>
-        <p:txBody>
-          <a:bodyPr/>
-          <a:lstStyle/>
-          <a:p>
-            <a:endParaRPr lang="de-DE" dirty="0"/>
-          </a:p>
-        </p:txBody>
-      </p:sp>
-    </p:spTree>
-    <p:extLst>
-      <p:ext uri="{BB962C8B-B14F-4D97-AF65-F5344CB8AC3E}">
-        <p14:creationId xmlns:p14="http://schemas.microsoft.com/office/powerpoint/2010/main" val="140067109"/>
-      </p:ext>
-    </p:extLst>
-  </p:cSld>
-  <p:clrMapOvr>
-    <a:masterClrMapping/>
-  </p:clrMapOvr>
-</p:sld>
-</file>
-
-<file path=ppt/slides/slide12.xml><?xml version="1.0" encoding="utf-8"?>
-<p:sld xmlns:a="http://schemas.openxmlformats.org/drawingml/2006/main" xmlns:r="http://schemas.openxmlformats.org/officeDocument/2006/relationships" xmlns:p="http://schemas.openxmlformats.org/presentationml/2006/main">
-  <p:cSld>
-    <p:spTree>
-      <p:nvGrpSpPr>
-        <p:cNvPr id="1" name=""/>
-        <p:cNvGrpSpPr/>
-        <p:nvPr/>
-      </p:nvGrpSpPr>
-      <p:grpSpPr>
-        <a:xfrm>
-          <a:off x="0" y="0"/>
-          <a:ext cx="0" cy="0"/>
-          <a:chOff x="0" y="0"/>
-          <a:chExt cx="0" cy="0"/>
-        </a:xfrm>
-      </p:grpSpPr>
-      <p:sp>
-        <p:nvSpPr>
-          <p:cNvPr id="2" name="Titel 1">
-            <a:extLst>
-              <a:ext uri="{FF2B5EF4-FFF2-40B4-BE49-F238E27FC236}">
-                <a16:creationId xmlns:a16="http://schemas.microsoft.com/office/drawing/2014/main" id="{594F37A0-8FD9-42A4-A80F-4C479182787E}"/>
-              </a:ext>
-            </a:extLst>
-          </p:cNvPr>
-          <p:cNvSpPr>
-            <a:spLocks noGrp="1"/>
-          </p:cNvSpPr>
-          <p:nvPr>
-            <p:ph type="title"/>
-          </p:nvPr>
-        </p:nvSpPr>
-        <p:spPr/>
-        <p:txBody>
-          <a:bodyPr/>
-          <a:lstStyle/>
-          <a:p>
-            <a:r>
-              <a:rPr lang="de-DE" dirty="0" err="1"/>
-              <a:t>evaluation</a:t>
-            </a:r>
-            <a:endParaRPr lang="de-DE" dirty="0"/>
+              <a:rPr lang="en-US" dirty="0" smtClean="0"/>
+              <a:t>Step 3 – Creating summaries from hierarchies</a:t>
+            </a:r>
+            <a:endParaRPr lang="en-US" dirty="0"/>
           </a:p>
         </p:txBody>
       </p:sp>
@@ -4345,7 +4415,7 @@
           <p:cNvPr id="3" name="Inhaltsplatzhalter 2">
             <a:extLst>
               <a:ext uri="{FF2B5EF4-FFF2-40B4-BE49-F238E27FC236}">
-                <a16:creationId xmlns:a16="http://schemas.microsoft.com/office/drawing/2014/main" id="{B201CE33-F1D7-423B-B373-1D449812B3D5}"/>
+                <a16:creationId xmlns:a16="http://schemas.microsoft.com/office/drawing/2014/main" xmlns="" id="{B201CE33-F1D7-423B-B373-1D449812B3D5}"/>
               </a:ext>
             </a:extLst>
           </p:cNvPr>
@@ -4361,65 +4431,73 @@
           <a:bodyPr/>
           <a:lstStyle/>
           <a:p>
-            <a:r>
-              <a:rPr lang="de-DE" dirty="0" err="1"/>
-              <a:t>each</a:t>
-            </a:r>
-            <a:r>
-              <a:rPr lang="de-DE" dirty="0"/>
+            <a:pPr>
+              <a:buFont typeface="Arial" pitchFamily="34" charset="0"/>
+              <a:buChar char="•"/>
+            </a:pPr>
+            <a:r>
+              <a:rPr lang="de-DE" dirty="0" err="1" smtClean="0"/>
+              <a:t>f</a:t>
+            </a:r>
+            <a:r>
+              <a:rPr lang="de-DE" dirty="0" err="1" smtClean="0"/>
+              <a:t>irst</a:t>
+            </a:r>
+            <a:r>
+              <a:rPr lang="de-DE" dirty="0" smtClean="0"/>
               <a:t> </a:t>
             </a:r>
             <a:r>
-              <a:rPr lang="de-DE" dirty="0" err="1"/>
-              <a:t>of</a:t>
-            </a:r>
-            <a:r>
-              <a:rPr lang="de-DE" dirty="0"/>
+              <a:rPr lang="de-DE" dirty="0" err="1" smtClean="0"/>
+              <a:t>approach</a:t>
+            </a:r>
+            <a:r>
+              <a:rPr lang="de-DE" dirty="0" smtClean="0"/>
+              <a:t>: </a:t>
+            </a:r>
+            <a:r>
+              <a:rPr lang="de-DE" dirty="0" err="1" smtClean="0"/>
+              <a:t>Iterate</a:t>
+            </a:r>
+            <a:r>
+              <a:rPr lang="de-DE" dirty="0" smtClean="0"/>
+              <a:t> in </a:t>
+            </a:r>
+            <a:r>
+              <a:rPr lang="de-DE" dirty="0" err="1" smtClean="0"/>
+              <a:t>depth-first</a:t>
+            </a:r>
+            <a:r>
+              <a:rPr lang="de-DE" dirty="0" smtClean="0"/>
               <a:t> </a:t>
             </a:r>
             <a:r>
-              <a:rPr lang="de-DE" dirty="0" err="1"/>
-              <a:t>our</a:t>
-            </a:r>
-            <a:r>
-              <a:rPr lang="de-DE" dirty="0"/>
+              <a:rPr lang="de-DE" dirty="0" err="1" smtClean="0"/>
+              <a:t>search</a:t>
+            </a:r>
+            <a:r>
+              <a:rPr lang="de-DE" dirty="0" smtClean="0"/>
+              <a:t> order </a:t>
+            </a:r>
+            <a:r>
+              <a:rPr lang="de-DE" dirty="0" err="1" smtClean="0"/>
+              <a:t>over</a:t>
+            </a:r>
+            <a:r>
+              <a:rPr lang="de-DE" dirty="0" smtClean="0"/>
               <a:t> </a:t>
             </a:r>
             <a:r>
-              <a:rPr lang="de-DE" dirty="0" err="1"/>
-              <a:t>summaries</a:t>
-            </a:r>
-            <a:r>
-              <a:rPr lang="de-DE" dirty="0"/>
+              <a:rPr lang="de-DE" dirty="0" err="1" smtClean="0"/>
+              <a:t>the</a:t>
+            </a:r>
+            <a:r>
+              <a:rPr lang="de-DE" dirty="0" smtClean="0"/>
               <a:t> </a:t>
             </a:r>
             <a:r>
-              <a:rPr lang="de-DE" dirty="0" err="1"/>
-              <a:t>were</a:t>
-            </a:r>
-            <a:r>
-              <a:rPr lang="de-DE" dirty="0"/>
-              <a:t> </a:t>
-            </a:r>
-            <a:r>
-              <a:rPr lang="de-DE" dirty="0" err="1"/>
-              <a:t>evaluated</a:t>
-            </a:r>
-            <a:r>
-              <a:rPr lang="de-DE" dirty="0"/>
-              <a:t> </a:t>
-            </a:r>
-            <a:r>
-              <a:rPr lang="de-DE" dirty="0" err="1"/>
-              <a:t>by</a:t>
-            </a:r>
-            <a:r>
-              <a:rPr lang="de-DE" dirty="0"/>
-              <a:t> at least 4 </a:t>
-            </a:r>
-            <a:r>
-              <a:rPr lang="de-DE" dirty="0" err="1"/>
-              <a:t>raters</a:t>
+              <a:rPr lang="de-DE" dirty="0" err="1" smtClean="0"/>
+              <a:t>nuggets</a:t>
             </a:r>
             <a:endParaRPr lang="de-DE" dirty="0"/>
           </a:p>
@@ -4430,12 +4508,12 @@
           <p:cNvPr id="5" name="Pfeil: Chevron 4">
             <a:extLst>
               <a:ext uri="{FF2B5EF4-FFF2-40B4-BE49-F238E27FC236}">
-                <a16:creationId xmlns:a16="http://schemas.microsoft.com/office/drawing/2014/main" id="{FE16A436-3EBF-406A-A452-2785E92CA870}"/>
+                <a16:creationId xmlns:a16="http://schemas.microsoft.com/office/drawing/2014/main" xmlns="" id="{FE16A436-3EBF-406A-A452-2785E92CA870}"/>
               </a:ext>
             </a:extLst>
           </p:cNvPr>
           <p:cNvSpPr/>
-          <p:nvPr userDrawn="1"/>
+          <p:nvPr/>
         </p:nvSpPr>
         <p:spPr>
           <a:xfrm>
@@ -4500,12 +4578,2313 @@
           <p:cNvPr id="6" name="Pfeil: Chevron 5">
             <a:extLst>
               <a:ext uri="{FF2B5EF4-FFF2-40B4-BE49-F238E27FC236}">
-                <a16:creationId xmlns:a16="http://schemas.microsoft.com/office/drawing/2014/main" id="{4B425B4C-53B0-4FDA-90C8-3EAE519EFFB2}"/>
+                <a16:creationId xmlns:a16="http://schemas.microsoft.com/office/drawing/2014/main" xmlns="" id="{4B425B4C-53B0-4FDA-90C8-3EAE519EFFB2}"/>
               </a:ext>
             </a:extLst>
           </p:cNvPr>
           <p:cNvSpPr/>
-          <p:nvPr userDrawn="1"/>
+          <p:nvPr/>
+        </p:nvSpPr>
+        <p:spPr>
+          <a:xfrm>
+            <a:off x="4607912" y="1591446"/>
+            <a:ext cx="2160000" cy="270000"/>
+          </a:xfrm>
+          <a:prstGeom prst="chevron">
+            <a:avLst/>
+          </a:prstGeom>
+          <a:solidFill>
+            <a:srgbClr val="9C1C26"/>
+          </a:solidFill>
+          <a:ln w="6350">
+            <a:solidFill>
+              <a:schemeClr val="tx1"/>
+            </a:solidFill>
+          </a:ln>
+        </p:spPr>
+        <p:style>
+          <a:lnRef idx="2">
+            <a:schemeClr val="accent1">
+              <a:shade val="50000"/>
+            </a:schemeClr>
+          </a:lnRef>
+          <a:fillRef idx="1">
+            <a:schemeClr val="accent1"/>
+          </a:fillRef>
+          <a:effectRef idx="0">
+            <a:schemeClr val="accent1"/>
+          </a:effectRef>
+          <a:fontRef idx="minor">
+            <a:schemeClr val="lt1"/>
+          </a:fontRef>
+        </p:style>
+        <p:txBody>
+          <a:bodyPr rot="0" spcFirstLastPara="0" vertOverflow="overflow" horzOverflow="overflow" vert="horz" wrap="square" lIns="91440" tIns="45720" rIns="91440" bIns="45720" numCol="1" spcCol="0" rtlCol="0" fromWordArt="0" anchor="ctr" anchorCtr="0" forceAA="0" compatLnSpc="1">
+            <a:prstTxWarp prst="textNoShape">
+              <a:avLst/>
+            </a:prstTxWarp>
+            <a:noAutofit/>
+          </a:bodyPr>
+          <a:lstStyle/>
+          <a:p>
+            <a:pPr algn="ctr"/>
+            <a:r>
+              <a:rPr lang="de-DE" sz="1400" dirty="0">
+                <a:solidFill>
+                  <a:schemeClr val="bg1"/>
+                </a:solidFill>
+              </a:rPr>
+              <a:t>Action</a:t>
+            </a:r>
+          </a:p>
+        </p:txBody>
+      </p:sp>
+      <p:sp>
+        <p:nvSpPr>
+          <p:cNvPr id="7" name="Pfeil: Chevron 6">
+            <a:extLst>
+              <a:ext uri="{FF2B5EF4-FFF2-40B4-BE49-F238E27FC236}">
+                <a16:creationId xmlns:a16="http://schemas.microsoft.com/office/drawing/2014/main" xmlns="" id="{14F5353B-3EA0-4F48-A473-08D522F34D71}"/>
+              </a:ext>
+            </a:extLst>
+          </p:cNvPr>
+          <p:cNvSpPr/>
+          <p:nvPr/>
+        </p:nvSpPr>
+        <p:spPr>
+          <a:xfrm>
+            <a:off x="6732480" y="1591446"/>
+            <a:ext cx="2160000" cy="270000"/>
+          </a:xfrm>
+          <a:prstGeom prst="chevron">
+            <a:avLst/>
+          </a:prstGeom>
+          <a:solidFill>
+            <a:schemeClr val="bg1"/>
+          </a:solidFill>
+          <a:ln w="6350">
+            <a:solidFill>
+              <a:schemeClr val="bg1">
+                <a:lumMod val="65000"/>
+              </a:schemeClr>
+            </a:solidFill>
+          </a:ln>
+        </p:spPr>
+        <p:style>
+          <a:lnRef idx="2">
+            <a:schemeClr val="accent1">
+              <a:shade val="50000"/>
+            </a:schemeClr>
+          </a:lnRef>
+          <a:fillRef idx="1">
+            <a:schemeClr val="accent1"/>
+          </a:fillRef>
+          <a:effectRef idx="0">
+            <a:schemeClr val="accent1"/>
+          </a:effectRef>
+          <a:fontRef idx="minor">
+            <a:schemeClr val="lt1"/>
+          </a:fontRef>
+        </p:style>
+        <p:txBody>
+          <a:bodyPr rot="0" spcFirstLastPara="0" vertOverflow="overflow" horzOverflow="overflow" vert="horz" wrap="square" lIns="91440" tIns="45720" rIns="91440" bIns="45720" numCol="1" spcCol="0" rtlCol="0" fromWordArt="0" anchor="ctr" anchorCtr="0" forceAA="0" compatLnSpc="1">
+            <a:prstTxWarp prst="textNoShape">
+              <a:avLst/>
+            </a:prstTxWarp>
+            <a:noAutofit/>
+          </a:bodyPr>
+          <a:lstStyle/>
+          <a:p>
+            <a:pPr algn="ctr"/>
+            <a:r>
+              <a:rPr lang="de-DE" sz="1400" dirty="0" err="1">
+                <a:solidFill>
+                  <a:schemeClr val="bg1">
+                    <a:lumMod val="65000"/>
+                  </a:schemeClr>
+                </a:solidFill>
+              </a:rPr>
+              <a:t>Result</a:t>
+            </a:r>
+            <a:endParaRPr lang="de-DE" sz="1400" dirty="0">
+              <a:solidFill>
+                <a:schemeClr val="bg1">
+                  <a:lumMod val="65000"/>
+                </a:schemeClr>
+              </a:solidFill>
+            </a:endParaRPr>
+          </a:p>
+        </p:txBody>
+      </p:sp>
+      <p:sp>
+        <p:nvSpPr>
+          <p:cNvPr id="8" name="Pfeil: Chevron 7">
+            <a:extLst>
+              <a:ext uri="{FF2B5EF4-FFF2-40B4-BE49-F238E27FC236}">
+                <a16:creationId xmlns:a16="http://schemas.microsoft.com/office/drawing/2014/main" xmlns="" id="{655E865C-680E-47F4-9F87-B4EB179E321D}"/>
+              </a:ext>
+            </a:extLst>
+          </p:cNvPr>
+          <p:cNvSpPr/>
+          <p:nvPr/>
+        </p:nvSpPr>
+        <p:spPr>
+          <a:xfrm>
+            <a:off x="358774" y="1591446"/>
+            <a:ext cx="2160000" cy="270000"/>
+          </a:xfrm>
+          <a:prstGeom prst="chevron">
+            <a:avLst/>
+          </a:prstGeom>
+          <a:solidFill>
+            <a:schemeClr val="bg1"/>
+          </a:solidFill>
+          <a:ln w="6350">
+            <a:solidFill>
+              <a:schemeClr val="bg1">
+                <a:lumMod val="65000"/>
+              </a:schemeClr>
+            </a:solidFill>
+          </a:ln>
+        </p:spPr>
+        <p:style>
+          <a:lnRef idx="2">
+            <a:schemeClr val="accent1">
+              <a:shade val="50000"/>
+            </a:schemeClr>
+          </a:lnRef>
+          <a:fillRef idx="1">
+            <a:schemeClr val="accent1"/>
+          </a:fillRef>
+          <a:effectRef idx="0">
+            <a:schemeClr val="accent1"/>
+          </a:effectRef>
+          <a:fontRef idx="minor">
+            <a:schemeClr val="lt1"/>
+          </a:fontRef>
+        </p:style>
+        <p:txBody>
+          <a:bodyPr rot="0" spcFirstLastPara="0" vertOverflow="overflow" horzOverflow="overflow" vert="horz" wrap="square" lIns="91440" tIns="45720" rIns="91440" bIns="45720" numCol="1" spcCol="0" rtlCol="0" fromWordArt="0" anchor="ctr" anchorCtr="0" forceAA="0" compatLnSpc="1">
+            <a:prstTxWarp prst="textNoShape">
+              <a:avLst/>
+            </a:prstTxWarp>
+            <a:noAutofit/>
+          </a:bodyPr>
+          <a:lstStyle/>
+          <a:p>
+            <a:pPr algn="ctr"/>
+            <a:r>
+              <a:rPr lang="de-DE" sz="1400" dirty="0">
+                <a:solidFill>
+                  <a:schemeClr val="bg1">
+                    <a:lumMod val="65000"/>
+                  </a:schemeClr>
+                </a:solidFill>
+              </a:rPr>
+              <a:t>Situation</a:t>
+            </a:r>
+          </a:p>
+        </p:txBody>
+      </p:sp>
+      <p:pic>
+        <p:nvPicPr>
+          <p:cNvPr id="12" name="Grafik 11" descr="AutoTS__Praesentation_Beispielgraph_2_mit_Auswahl.png"/>
+          <p:cNvPicPr>
+            <a:picLocks noChangeAspect="1"/>
+          </p:cNvPicPr>
+          <p:nvPr/>
+        </p:nvPicPr>
+        <p:blipFill>
+          <a:blip r:embed="rId2" cstate="print"/>
+          <a:stretch>
+            <a:fillRect/>
+          </a:stretch>
+        </p:blipFill>
+        <p:spPr>
+          <a:xfrm>
+            <a:off x="1151620" y="2420889"/>
+            <a:ext cx="6840760" cy="3758268"/>
+          </a:xfrm>
+          <a:prstGeom prst="rect">
+            <a:avLst/>
+          </a:prstGeom>
+        </p:spPr>
+      </p:pic>
+    </p:spTree>
+    <p:extLst>
+      <p:ext uri="{BB962C8B-B14F-4D97-AF65-F5344CB8AC3E}">
+        <p14:creationId xmlns:p14="http://schemas.microsoft.com/office/powerpoint/2010/main" xmlns="" val="3359108963"/>
+      </p:ext>
+    </p:extLst>
+  </p:cSld>
+  <p:clrMapOvr>
+    <a:masterClrMapping/>
+  </p:clrMapOvr>
+  <p:timing>
+    <p:tnLst>
+      <p:par>
+        <p:cTn id="1" dur="indefinite" restart="never" nodeType="tmRoot"/>
+      </p:par>
+    </p:tnLst>
+  </p:timing>
+</p:sld>
+</file>
+
+<file path=ppt/slides/slide12.xml><?xml version="1.0" encoding="utf-8"?>
+<p:sld xmlns:a="http://schemas.openxmlformats.org/drawingml/2006/main" xmlns:r="http://schemas.openxmlformats.org/officeDocument/2006/relationships" xmlns:p="http://schemas.openxmlformats.org/presentationml/2006/main">
+  <p:cSld>
+    <p:spTree>
+      <p:nvGrpSpPr>
+        <p:cNvPr id="1" name=""/>
+        <p:cNvGrpSpPr/>
+        <p:nvPr/>
+      </p:nvGrpSpPr>
+      <p:grpSpPr>
+        <a:xfrm>
+          <a:off x="0" y="0"/>
+          <a:ext cx="0" cy="0"/>
+          <a:chOff x="0" y="0"/>
+          <a:chExt cx="0" cy="0"/>
+        </a:xfrm>
+      </p:grpSpPr>
+      <p:sp>
+        <p:nvSpPr>
+          <p:cNvPr id="2" name="Titel 1">
+            <a:extLst>
+              <a:ext uri="{FF2B5EF4-FFF2-40B4-BE49-F238E27FC236}">
+                <a16:creationId xmlns:a16="http://schemas.microsoft.com/office/drawing/2014/main" xmlns="" id="{594F37A0-8FD9-42A4-A80F-4C479182787E}"/>
+              </a:ext>
+            </a:extLst>
+          </p:cNvPr>
+          <p:cNvSpPr>
+            <a:spLocks noGrp="1"/>
+          </p:cNvSpPr>
+          <p:nvPr>
+            <p:ph type="title"/>
+          </p:nvPr>
+        </p:nvSpPr>
+        <p:spPr/>
+        <p:txBody>
+          <a:bodyPr/>
+          <a:lstStyle/>
+          <a:p>
+            <a:r>
+              <a:rPr lang="en-US" dirty="0" smtClean="0"/>
+              <a:t>Step 3 – Creating summaries from hierarchies</a:t>
+            </a:r>
+            <a:endParaRPr lang="en-US" dirty="0"/>
+          </a:p>
+        </p:txBody>
+      </p:sp>
+      <p:sp>
+        <p:nvSpPr>
+          <p:cNvPr id="3" name="Inhaltsplatzhalter 2">
+            <a:extLst>
+              <a:ext uri="{FF2B5EF4-FFF2-40B4-BE49-F238E27FC236}">
+                <a16:creationId xmlns:a16="http://schemas.microsoft.com/office/drawing/2014/main" xmlns="" id="{B201CE33-F1D7-423B-B373-1D449812B3D5}"/>
+              </a:ext>
+            </a:extLst>
+          </p:cNvPr>
+          <p:cNvSpPr>
+            <a:spLocks noGrp="1"/>
+          </p:cNvSpPr>
+          <p:nvPr>
+            <p:ph idx="1"/>
+          </p:nvPr>
+        </p:nvSpPr>
+        <p:spPr/>
+        <p:txBody>
+          <a:bodyPr/>
+          <a:lstStyle/>
+          <a:p>
+            <a:pPr>
+              <a:buFont typeface="Arial" pitchFamily="34" charset="0"/>
+              <a:buChar char="•"/>
+            </a:pPr>
+            <a:r>
+              <a:rPr lang="de-DE" dirty="0" err="1" smtClean="0"/>
+              <a:t>c</a:t>
+            </a:r>
+            <a:r>
+              <a:rPr lang="de-DE" dirty="0" err="1" smtClean="0"/>
+              <a:t>ut</a:t>
+            </a:r>
+            <a:r>
+              <a:rPr lang="de-DE" dirty="0" smtClean="0"/>
+              <a:t> </a:t>
+            </a:r>
+            <a:r>
+              <a:rPr lang="de-DE" dirty="0" err="1" smtClean="0"/>
+              <a:t>layers</a:t>
+            </a:r>
+            <a:r>
+              <a:rPr lang="de-DE" dirty="0" smtClean="0"/>
+              <a:t> off </a:t>
+            </a:r>
+            <a:r>
+              <a:rPr lang="de-DE" dirty="0" err="1" smtClean="0"/>
+              <a:t>to</a:t>
+            </a:r>
+            <a:r>
+              <a:rPr lang="de-DE" dirty="0" smtClean="0"/>
+              <a:t> </a:t>
+            </a:r>
+            <a:r>
+              <a:rPr lang="de-DE" dirty="0" err="1" smtClean="0"/>
+              <a:t>get</a:t>
+            </a:r>
+            <a:r>
+              <a:rPr lang="de-DE" dirty="0" smtClean="0"/>
+              <a:t> </a:t>
+            </a:r>
+            <a:r>
+              <a:rPr lang="de-DE" dirty="0" err="1" smtClean="0"/>
+              <a:t>shorter</a:t>
+            </a:r>
+            <a:r>
+              <a:rPr lang="de-DE" dirty="0" smtClean="0"/>
+              <a:t> </a:t>
+            </a:r>
+            <a:r>
+              <a:rPr lang="de-DE" dirty="0" err="1" smtClean="0"/>
+              <a:t>summaries</a:t>
+            </a:r>
+            <a:endParaRPr lang="de-DE" dirty="0"/>
+          </a:p>
+        </p:txBody>
+      </p:sp>
+      <p:sp>
+        <p:nvSpPr>
+          <p:cNvPr id="5" name="Pfeil: Chevron 4">
+            <a:extLst>
+              <a:ext uri="{FF2B5EF4-FFF2-40B4-BE49-F238E27FC236}">
+                <a16:creationId xmlns:a16="http://schemas.microsoft.com/office/drawing/2014/main" xmlns="" id="{FE16A436-3EBF-406A-A452-2785E92CA870}"/>
+              </a:ext>
+            </a:extLst>
+          </p:cNvPr>
+          <p:cNvSpPr/>
+          <p:nvPr/>
+        </p:nvSpPr>
+        <p:spPr>
+          <a:xfrm>
+            <a:off x="2483343" y="1591446"/>
+            <a:ext cx="2160000" cy="270000"/>
+          </a:xfrm>
+          <a:prstGeom prst="chevron">
+            <a:avLst/>
+          </a:prstGeom>
+          <a:solidFill>
+            <a:schemeClr val="bg1"/>
+          </a:solidFill>
+          <a:ln w="6350">
+            <a:solidFill>
+              <a:schemeClr val="bg1">
+                <a:lumMod val="65000"/>
+              </a:schemeClr>
+            </a:solidFill>
+          </a:ln>
+        </p:spPr>
+        <p:style>
+          <a:lnRef idx="2">
+            <a:schemeClr val="accent1">
+              <a:shade val="50000"/>
+            </a:schemeClr>
+          </a:lnRef>
+          <a:fillRef idx="1">
+            <a:schemeClr val="accent1"/>
+          </a:fillRef>
+          <a:effectRef idx="0">
+            <a:schemeClr val="accent1"/>
+          </a:effectRef>
+          <a:fontRef idx="minor">
+            <a:schemeClr val="lt1"/>
+          </a:fontRef>
+        </p:style>
+        <p:txBody>
+          <a:bodyPr rot="0" spcFirstLastPara="0" vertOverflow="overflow" horzOverflow="overflow" vert="horz" wrap="square" lIns="91440" tIns="45720" rIns="91440" bIns="45720" numCol="1" spcCol="0" rtlCol="0" fromWordArt="0" anchor="ctr" anchorCtr="0" forceAA="0" compatLnSpc="1">
+            <a:prstTxWarp prst="textNoShape">
+              <a:avLst/>
+            </a:prstTxWarp>
+            <a:noAutofit/>
+          </a:bodyPr>
+          <a:lstStyle/>
+          <a:p>
+            <a:pPr algn="ctr"/>
+            <a:r>
+              <a:rPr lang="de-DE" sz="1400" dirty="0">
+                <a:solidFill>
+                  <a:schemeClr val="bg1">
+                    <a:lumMod val="65000"/>
+                  </a:schemeClr>
+                </a:solidFill>
+              </a:rPr>
+              <a:t>Task</a:t>
+            </a:r>
+          </a:p>
+        </p:txBody>
+      </p:sp>
+      <p:sp>
+        <p:nvSpPr>
+          <p:cNvPr id="6" name="Pfeil: Chevron 5">
+            <a:extLst>
+              <a:ext uri="{FF2B5EF4-FFF2-40B4-BE49-F238E27FC236}">
+                <a16:creationId xmlns:a16="http://schemas.microsoft.com/office/drawing/2014/main" xmlns="" id="{4B425B4C-53B0-4FDA-90C8-3EAE519EFFB2}"/>
+              </a:ext>
+            </a:extLst>
+          </p:cNvPr>
+          <p:cNvSpPr/>
+          <p:nvPr/>
+        </p:nvSpPr>
+        <p:spPr>
+          <a:xfrm>
+            <a:off x="4607912" y="1591446"/>
+            <a:ext cx="2160000" cy="270000"/>
+          </a:xfrm>
+          <a:prstGeom prst="chevron">
+            <a:avLst/>
+          </a:prstGeom>
+          <a:solidFill>
+            <a:srgbClr val="9C1C26"/>
+          </a:solidFill>
+          <a:ln w="6350">
+            <a:solidFill>
+              <a:schemeClr val="tx1"/>
+            </a:solidFill>
+          </a:ln>
+        </p:spPr>
+        <p:style>
+          <a:lnRef idx="2">
+            <a:schemeClr val="accent1">
+              <a:shade val="50000"/>
+            </a:schemeClr>
+          </a:lnRef>
+          <a:fillRef idx="1">
+            <a:schemeClr val="accent1"/>
+          </a:fillRef>
+          <a:effectRef idx="0">
+            <a:schemeClr val="accent1"/>
+          </a:effectRef>
+          <a:fontRef idx="minor">
+            <a:schemeClr val="lt1"/>
+          </a:fontRef>
+        </p:style>
+        <p:txBody>
+          <a:bodyPr rot="0" spcFirstLastPara="0" vertOverflow="overflow" horzOverflow="overflow" vert="horz" wrap="square" lIns="91440" tIns="45720" rIns="91440" bIns="45720" numCol="1" spcCol="0" rtlCol="0" fromWordArt="0" anchor="ctr" anchorCtr="0" forceAA="0" compatLnSpc="1">
+            <a:prstTxWarp prst="textNoShape">
+              <a:avLst/>
+            </a:prstTxWarp>
+            <a:noAutofit/>
+          </a:bodyPr>
+          <a:lstStyle/>
+          <a:p>
+            <a:pPr algn="ctr"/>
+            <a:r>
+              <a:rPr lang="de-DE" sz="1400" dirty="0">
+                <a:solidFill>
+                  <a:schemeClr val="bg1"/>
+                </a:solidFill>
+              </a:rPr>
+              <a:t>Action</a:t>
+            </a:r>
+          </a:p>
+        </p:txBody>
+      </p:sp>
+      <p:sp>
+        <p:nvSpPr>
+          <p:cNvPr id="7" name="Pfeil: Chevron 6">
+            <a:extLst>
+              <a:ext uri="{FF2B5EF4-FFF2-40B4-BE49-F238E27FC236}">
+                <a16:creationId xmlns:a16="http://schemas.microsoft.com/office/drawing/2014/main" xmlns="" id="{14F5353B-3EA0-4F48-A473-08D522F34D71}"/>
+              </a:ext>
+            </a:extLst>
+          </p:cNvPr>
+          <p:cNvSpPr/>
+          <p:nvPr/>
+        </p:nvSpPr>
+        <p:spPr>
+          <a:xfrm>
+            <a:off x="6732480" y="1591446"/>
+            <a:ext cx="2160000" cy="270000"/>
+          </a:xfrm>
+          <a:prstGeom prst="chevron">
+            <a:avLst/>
+          </a:prstGeom>
+          <a:solidFill>
+            <a:schemeClr val="bg1"/>
+          </a:solidFill>
+          <a:ln w="6350">
+            <a:solidFill>
+              <a:schemeClr val="bg1">
+                <a:lumMod val="65000"/>
+              </a:schemeClr>
+            </a:solidFill>
+          </a:ln>
+        </p:spPr>
+        <p:style>
+          <a:lnRef idx="2">
+            <a:schemeClr val="accent1">
+              <a:shade val="50000"/>
+            </a:schemeClr>
+          </a:lnRef>
+          <a:fillRef idx="1">
+            <a:schemeClr val="accent1"/>
+          </a:fillRef>
+          <a:effectRef idx="0">
+            <a:schemeClr val="accent1"/>
+          </a:effectRef>
+          <a:fontRef idx="minor">
+            <a:schemeClr val="lt1"/>
+          </a:fontRef>
+        </p:style>
+        <p:txBody>
+          <a:bodyPr rot="0" spcFirstLastPara="0" vertOverflow="overflow" horzOverflow="overflow" vert="horz" wrap="square" lIns="91440" tIns="45720" rIns="91440" bIns="45720" numCol="1" spcCol="0" rtlCol="0" fromWordArt="0" anchor="ctr" anchorCtr="0" forceAA="0" compatLnSpc="1">
+            <a:prstTxWarp prst="textNoShape">
+              <a:avLst/>
+            </a:prstTxWarp>
+            <a:noAutofit/>
+          </a:bodyPr>
+          <a:lstStyle/>
+          <a:p>
+            <a:pPr algn="ctr"/>
+            <a:r>
+              <a:rPr lang="de-DE" sz="1400" dirty="0" err="1">
+                <a:solidFill>
+                  <a:schemeClr val="bg1">
+                    <a:lumMod val="65000"/>
+                  </a:schemeClr>
+                </a:solidFill>
+              </a:rPr>
+              <a:t>Result</a:t>
+            </a:r>
+            <a:endParaRPr lang="de-DE" sz="1400" dirty="0">
+              <a:solidFill>
+                <a:schemeClr val="bg1">
+                  <a:lumMod val="65000"/>
+                </a:schemeClr>
+              </a:solidFill>
+            </a:endParaRPr>
+          </a:p>
+        </p:txBody>
+      </p:sp>
+      <p:sp>
+        <p:nvSpPr>
+          <p:cNvPr id="8" name="Pfeil: Chevron 7">
+            <a:extLst>
+              <a:ext uri="{FF2B5EF4-FFF2-40B4-BE49-F238E27FC236}">
+                <a16:creationId xmlns:a16="http://schemas.microsoft.com/office/drawing/2014/main" xmlns="" id="{655E865C-680E-47F4-9F87-B4EB179E321D}"/>
+              </a:ext>
+            </a:extLst>
+          </p:cNvPr>
+          <p:cNvSpPr/>
+          <p:nvPr/>
+        </p:nvSpPr>
+        <p:spPr>
+          <a:xfrm>
+            <a:off x="358774" y="1591446"/>
+            <a:ext cx="2160000" cy="270000"/>
+          </a:xfrm>
+          <a:prstGeom prst="chevron">
+            <a:avLst/>
+          </a:prstGeom>
+          <a:solidFill>
+            <a:schemeClr val="bg1"/>
+          </a:solidFill>
+          <a:ln w="6350">
+            <a:solidFill>
+              <a:schemeClr val="bg1">
+                <a:lumMod val="65000"/>
+              </a:schemeClr>
+            </a:solidFill>
+          </a:ln>
+        </p:spPr>
+        <p:style>
+          <a:lnRef idx="2">
+            <a:schemeClr val="accent1">
+              <a:shade val="50000"/>
+            </a:schemeClr>
+          </a:lnRef>
+          <a:fillRef idx="1">
+            <a:schemeClr val="accent1"/>
+          </a:fillRef>
+          <a:effectRef idx="0">
+            <a:schemeClr val="accent1"/>
+          </a:effectRef>
+          <a:fontRef idx="minor">
+            <a:schemeClr val="lt1"/>
+          </a:fontRef>
+        </p:style>
+        <p:txBody>
+          <a:bodyPr rot="0" spcFirstLastPara="0" vertOverflow="overflow" horzOverflow="overflow" vert="horz" wrap="square" lIns="91440" tIns="45720" rIns="91440" bIns="45720" numCol="1" spcCol="0" rtlCol="0" fromWordArt="0" anchor="ctr" anchorCtr="0" forceAA="0" compatLnSpc="1">
+            <a:prstTxWarp prst="textNoShape">
+              <a:avLst/>
+            </a:prstTxWarp>
+            <a:noAutofit/>
+          </a:bodyPr>
+          <a:lstStyle/>
+          <a:p>
+            <a:pPr algn="ctr"/>
+            <a:r>
+              <a:rPr lang="de-DE" sz="1400" dirty="0">
+                <a:solidFill>
+                  <a:schemeClr val="bg1">
+                    <a:lumMod val="65000"/>
+                  </a:schemeClr>
+                </a:solidFill>
+              </a:rPr>
+              <a:t>Situation</a:t>
+            </a:r>
+          </a:p>
+        </p:txBody>
+      </p:sp>
+      <p:pic>
+        <p:nvPicPr>
+          <p:cNvPr id="12" name="Grafik 11" descr="AutoTS__Praesentation_Beispielgraph_2_mit_Auswahl.png"/>
+          <p:cNvPicPr>
+            <a:picLocks noChangeAspect="1"/>
+          </p:cNvPicPr>
+          <p:nvPr/>
+        </p:nvPicPr>
+        <p:blipFill>
+          <a:blip r:embed="rId2" cstate="print"/>
+          <a:stretch>
+            <a:fillRect/>
+          </a:stretch>
+        </p:blipFill>
+        <p:spPr>
+          <a:xfrm>
+            <a:off x="1044824" y="2420887"/>
+            <a:ext cx="7190348" cy="3780000"/>
+          </a:xfrm>
+          <a:prstGeom prst="rect">
+            <a:avLst/>
+          </a:prstGeom>
+        </p:spPr>
+      </p:pic>
+    </p:spTree>
+    <p:extLst>
+      <p:ext uri="{BB962C8B-B14F-4D97-AF65-F5344CB8AC3E}">
+        <p14:creationId xmlns:p14="http://schemas.microsoft.com/office/powerpoint/2010/main" xmlns="" val="3359108963"/>
+      </p:ext>
+    </p:extLst>
+  </p:cSld>
+  <p:clrMapOvr>
+    <a:masterClrMapping/>
+  </p:clrMapOvr>
+  <p:timing>
+    <p:tnLst>
+      <p:par>
+        <p:cTn id="1" dur="indefinite" restart="never" nodeType="tmRoot"/>
+      </p:par>
+    </p:tnLst>
+  </p:timing>
+</p:sld>
+</file>
+
+<file path=ppt/slides/slide13.xml><?xml version="1.0" encoding="utf-8"?>
+<p:sld xmlns:a="http://schemas.openxmlformats.org/drawingml/2006/main" xmlns:r="http://schemas.openxmlformats.org/officeDocument/2006/relationships" xmlns:p="http://schemas.openxmlformats.org/presentationml/2006/main">
+  <p:cSld>
+    <p:spTree>
+      <p:nvGrpSpPr>
+        <p:cNvPr id="1" name=""/>
+        <p:cNvGrpSpPr/>
+        <p:nvPr/>
+      </p:nvGrpSpPr>
+      <p:grpSpPr>
+        <a:xfrm>
+          <a:off x="0" y="0"/>
+          <a:ext cx="0" cy="0"/>
+          <a:chOff x="0" y="0"/>
+          <a:chExt cx="0" cy="0"/>
+        </a:xfrm>
+      </p:grpSpPr>
+      <p:sp>
+        <p:nvSpPr>
+          <p:cNvPr id="2" name="Titel 1">
+            <a:extLst>
+              <a:ext uri="{FF2B5EF4-FFF2-40B4-BE49-F238E27FC236}">
+                <a16:creationId xmlns:a16="http://schemas.microsoft.com/office/drawing/2014/main" xmlns="" id="{594F37A0-8FD9-42A4-A80F-4C479182787E}"/>
+              </a:ext>
+            </a:extLst>
+          </p:cNvPr>
+          <p:cNvSpPr>
+            <a:spLocks noGrp="1"/>
+          </p:cNvSpPr>
+          <p:nvPr>
+            <p:ph type="title"/>
+          </p:nvPr>
+        </p:nvSpPr>
+        <p:spPr/>
+        <p:txBody>
+          <a:bodyPr/>
+          <a:lstStyle/>
+          <a:p>
+            <a:r>
+              <a:rPr lang="en-US" dirty="0" smtClean="0"/>
+              <a:t>Step 3 – Creating summaries from hierarchies</a:t>
+            </a:r>
+            <a:endParaRPr lang="en-US" dirty="0"/>
+          </a:p>
+        </p:txBody>
+      </p:sp>
+      <p:sp>
+        <p:nvSpPr>
+          <p:cNvPr id="3" name="Inhaltsplatzhalter 2">
+            <a:extLst>
+              <a:ext uri="{FF2B5EF4-FFF2-40B4-BE49-F238E27FC236}">
+                <a16:creationId xmlns:a16="http://schemas.microsoft.com/office/drawing/2014/main" xmlns="" id="{B201CE33-F1D7-423B-B373-1D449812B3D5}"/>
+              </a:ext>
+            </a:extLst>
+          </p:cNvPr>
+          <p:cNvSpPr>
+            <a:spLocks noGrp="1"/>
+          </p:cNvSpPr>
+          <p:nvPr>
+            <p:ph idx="1"/>
+          </p:nvPr>
+        </p:nvSpPr>
+        <p:spPr/>
+        <p:txBody>
+          <a:bodyPr/>
+          <a:lstStyle/>
+          <a:p>
+            <a:pPr>
+              <a:buFont typeface="Arial" pitchFamily="34" charset="0"/>
+              <a:buChar char="•"/>
+            </a:pPr>
+            <a:r>
+              <a:rPr lang="de-DE" dirty="0" err="1" smtClean="0"/>
+              <a:t>p</a:t>
+            </a:r>
+            <a:r>
+              <a:rPr lang="de-DE" dirty="0" err="1" smtClean="0"/>
+              <a:t>roblem</a:t>
+            </a:r>
+            <a:r>
+              <a:rPr lang="de-DE" dirty="0" smtClean="0"/>
+              <a:t> </a:t>
+            </a:r>
+            <a:r>
+              <a:rPr lang="de-DE" dirty="0" err="1" smtClean="0"/>
+              <a:t>when</a:t>
+            </a:r>
+            <a:r>
+              <a:rPr lang="de-DE" dirty="0" smtClean="0"/>
+              <a:t> </a:t>
+            </a:r>
+            <a:r>
+              <a:rPr lang="de-DE" dirty="0" err="1" smtClean="0"/>
+              <a:t>summaries</a:t>
+            </a:r>
+            <a:r>
+              <a:rPr lang="de-DE" dirty="0" smtClean="0"/>
+              <a:t> </a:t>
+            </a:r>
+            <a:r>
+              <a:rPr lang="de-DE" dirty="0" err="1" smtClean="0"/>
+              <a:t>are</a:t>
+            </a:r>
+            <a:r>
+              <a:rPr lang="de-DE" dirty="0" smtClean="0"/>
+              <a:t> </a:t>
+            </a:r>
+            <a:r>
+              <a:rPr lang="de-DE" dirty="0" err="1" smtClean="0"/>
+              <a:t>very</a:t>
+            </a:r>
+            <a:r>
+              <a:rPr lang="de-DE" dirty="0" smtClean="0"/>
+              <a:t> </a:t>
+            </a:r>
+            <a:r>
+              <a:rPr lang="de-DE" dirty="0" err="1" smtClean="0"/>
+              <a:t>short</a:t>
+            </a:r>
+            <a:endParaRPr lang="de-DE" dirty="0"/>
+          </a:p>
+        </p:txBody>
+      </p:sp>
+      <p:sp>
+        <p:nvSpPr>
+          <p:cNvPr id="5" name="Pfeil: Chevron 4">
+            <a:extLst>
+              <a:ext uri="{FF2B5EF4-FFF2-40B4-BE49-F238E27FC236}">
+                <a16:creationId xmlns:a16="http://schemas.microsoft.com/office/drawing/2014/main" xmlns="" id="{FE16A436-3EBF-406A-A452-2785E92CA870}"/>
+              </a:ext>
+            </a:extLst>
+          </p:cNvPr>
+          <p:cNvSpPr/>
+          <p:nvPr/>
+        </p:nvSpPr>
+        <p:spPr>
+          <a:xfrm>
+            <a:off x="2483343" y="1591446"/>
+            <a:ext cx="2160000" cy="270000"/>
+          </a:xfrm>
+          <a:prstGeom prst="chevron">
+            <a:avLst/>
+          </a:prstGeom>
+          <a:solidFill>
+            <a:schemeClr val="bg1"/>
+          </a:solidFill>
+          <a:ln w="6350">
+            <a:solidFill>
+              <a:schemeClr val="bg1">
+                <a:lumMod val="65000"/>
+              </a:schemeClr>
+            </a:solidFill>
+          </a:ln>
+        </p:spPr>
+        <p:style>
+          <a:lnRef idx="2">
+            <a:schemeClr val="accent1">
+              <a:shade val="50000"/>
+            </a:schemeClr>
+          </a:lnRef>
+          <a:fillRef idx="1">
+            <a:schemeClr val="accent1"/>
+          </a:fillRef>
+          <a:effectRef idx="0">
+            <a:schemeClr val="accent1"/>
+          </a:effectRef>
+          <a:fontRef idx="minor">
+            <a:schemeClr val="lt1"/>
+          </a:fontRef>
+        </p:style>
+        <p:txBody>
+          <a:bodyPr rot="0" spcFirstLastPara="0" vertOverflow="overflow" horzOverflow="overflow" vert="horz" wrap="square" lIns="91440" tIns="45720" rIns="91440" bIns="45720" numCol="1" spcCol="0" rtlCol="0" fromWordArt="0" anchor="ctr" anchorCtr="0" forceAA="0" compatLnSpc="1">
+            <a:prstTxWarp prst="textNoShape">
+              <a:avLst/>
+            </a:prstTxWarp>
+            <a:noAutofit/>
+          </a:bodyPr>
+          <a:lstStyle/>
+          <a:p>
+            <a:pPr algn="ctr"/>
+            <a:r>
+              <a:rPr lang="de-DE" sz="1400" dirty="0">
+                <a:solidFill>
+                  <a:schemeClr val="bg1">
+                    <a:lumMod val="65000"/>
+                  </a:schemeClr>
+                </a:solidFill>
+              </a:rPr>
+              <a:t>Task</a:t>
+            </a:r>
+          </a:p>
+        </p:txBody>
+      </p:sp>
+      <p:sp>
+        <p:nvSpPr>
+          <p:cNvPr id="6" name="Pfeil: Chevron 5">
+            <a:extLst>
+              <a:ext uri="{FF2B5EF4-FFF2-40B4-BE49-F238E27FC236}">
+                <a16:creationId xmlns:a16="http://schemas.microsoft.com/office/drawing/2014/main" xmlns="" id="{4B425B4C-53B0-4FDA-90C8-3EAE519EFFB2}"/>
+              </a:ext>
+            </a:extLst>
+          </p:cNvPr>
+          <p:cNvSpPr/>
+          <p:nvPr/>
+        </p:nvSpPr>
+        <p:spPr>
+          <a:xfrm>
+            <a:off x="4607912" y="1591446"/>
+            <a:ext cx="2160000" cy="270000"/>
+          </a:xfrm>
+          <a:prstGeom prst="chevron">
+            <a:avLst/>
+          </a:prstGeom>
+          <a:solidFill>
+            <a:srgbClr val="9C1C26"/>
+          </a:solidFill>
+          <a:ln w="6350">
+            <a:solidFill>
+              <a:schemeClr val="tx1"/>
+            </a:solidFill>
+          </a:ln>
+        </p:spPr>
+        <p:style>
+          <a:lnRef idx="2">
+            <a:schemeClr val="accent1">
+              <a:shade val="50000"/>
+            </a:schemeClr>
+          </a:lnRef>
+          <a:fillRef idx="1">
+            <a:schemeClr val="accent1"/>
+          </a:fillRef>
+          <a:effectRef idx="0">
+            <a:schemeClr val="accent1"/>
+          </a:effectRef>
+          <a:fontRef idx="minor">
+            <a:schemeClr val="lt1"/>
+          </a:fontRef>
+        </p:style>
+        <p:txBody>
+          <a:bodyPr rot="0" spcFirstLastPara="0" vertOverflow="overflow" horzOverflow="overflow" vert="horz" wrap="square" lIns="91440" tIns="45720" rIns="91440" bIns="45720" numCol="1" spcCol="0" rtlCol="0" fromWordArt="0" anchor="ctr" anchorCtr="0" forceAA="0" compatLnSpc="1">
+            <a:prstTxWarp prst="textNoShape">
+              <a:avLst/>
+            </a:prstTxWarp>
+            <a:noAutofit/>
+          </a:bodyPr>
+          <a:lstStyle/>
+          <a:p>
+            <a:pPr algn="ctr"/>
+            <a:r>
+              <a:rPr lang="de-DE" sz="1400" dirty="0">
+                <a:solidFill>
+                  <a:schemeClr val="bg1"/>
+                </a:solidFill>
+              </a:rPr>
+              <a:t>Action</a:t>
+            </a:r>
+          </a:p>
+        </p:txBody>
+      </p:sp>
+      <p:sp>
+        <p:nvSpPr>
+          <p:cNvPr id="7" name="Pfeil: Chevron 6">
+            <a:extLst>
+              <a:ext uri="{FF2B5EF4-FFF2-40B4-BE49-F238E27FC236}">
+                <a16:creationId xmlns:a16="http://schemas.microsoft.com/office/drawing/2014/main" xmlns="" id="{14F5353B-3EA0-4F48-A473-08D522F34D71}"/>
+              </a:ext>
+            </a:extLst>
+          </p:cNvPr>
+          <p:cNvSpPr/>
+          <p:nvPr/>
+        </p:nvSpPr>
+        <p:spPr>
+          <a:xfrm>
+            <a:off x="6732480" y="1591446"/>
+            <a:ext cx="2160000" cy="270000"/>
+          </a:xfrm>
+          <a:prstGeom prst="chevron">
+            <a:avLst/>
+          </a:prstGeom>
+          <a:solidFill>
+            <a:schemeClr val="bg1"/>
+          </a:solidFill>
+          <a:ln w="6350">
+            <a:solidFill>
+              <a:schemeClr val="bg1">
+                <a:lumMod val="65000"/>
+              </a:schemeClr>
+            </a:solidFill>
+          </a:ln>
+        </p:spPr>
+        <p:style>
+          <a:lnRef idx="2">
+            <a:schemeClr val="accent1">
+              <a:shade val="50000"/>
+            </a:schemeClr>
+          </a:lnRef>
+          <a:fillRef idx="1">
+            <a:schemeClr val="accent1"/>
+          </a:fillRef>
+          <a:effectRef idx="0">
+            <a:schemeClr val="accent1"/>
+          </a:effectRef>
+          <a:fontRef idx="minor">
+            <a:schemeClr val="lt1"/>
+          </a:fontRef>
+        </p:style>
+        <p:txBody>
+          <a:bodyPr rot="0" spcFirstLastPara="0" vertOverflow="overflow" horzOverflow="overflow" vert="horz" wrap="square" lIns="91440" tIns="45720" rIns="91440" bIns="45720" numCol="1" spcCol="0" rtlCol="0" fromWordArt="0" anchor="ctr" anchorCtr="0" forceAA="0" compatLnSpc="1">
+            <a:prstTxWarp prst="textNoShape">
+              <a:avLst/>
+            </a:prstTxWarp>
+            <a:noAutofit/>
+          </a:bodyPr>
+          <a:lstStyle/>
+          <a:p>
+            <a:pPr algn="ctr"/>
+            <a:r>
+              <a:rPr lang="de-DE" sz="1400" dirty="0" err="1">
+                <a:solidFill>
+                  <a:schemeClr val="bg1">
+                    <a:lumMod val="65000"/>
+                  </a:schemeClr>
+                </a:solidFill>
+              </a:rPr>
+              <a:t>Result</a:t>
+            </a:r>
+            <a:endParaRPr lang="de-DE" sz="1400" dirty="0">
+              <a:solidFill>
+                <a:schemeClr val="bg1">
+                  <a:lumMod val="65000"/>
+                </a:schemeClr>
+              </a:solidFill>
+            </a:endParaRPr>
+          </a:p>
+        </p:txBody>
+      </p:sp>
+      <p:sp>
+        <p:nvSpPr>
+          <p:cNvPr id="8" name="Pfeil: Chevron 7">
+            <a:extLst>
+              <a:ext uri="{FF2B5EF4-FFF2-40B4-BE49-F238E27FC236}">
+                <a16:creationId xmlns:a16="http://schemas.microsoft.com/office/drawing/2014/main" xmlns="" id="{655E865C-680E-47F4-9F87-B4EB179E321D}"/>
+              </a:ext>
+            </a:extLst>
+          </p:cNvPr>
+          <p:cNvSpPr/>
+          <p:nvPr/>
+        </p:nvSpPr>
+        <p:spPr>
+          <a:xfrm>
+            <a:off x="358774" y="1591446"/>
+            <a:ext cx="2160000" cy="270000"/>
+          </a:xfrm>
+          <a:prstGeom prst="chevron">
+            <a:avLst/>
+          </a:prstGeom>
+          <a:solidFill>
+            <a:schemeClr val="bg1"/>
+          </a:solidFill>
+          <a:ln w="6350">
+            <a:solidFill>
+              <a:schemeClr val="bg1">
+                <a:lumMod val="65000"/>
+              </a:schemeClr>
+            </a:solidFill>
+          </a:ln>
+        </p:spPr>
+        <p:style>
+          <a:lnRef idx="2">
+            <a:schemeClr val="accent1">
+              <a:shade val="50000"/>
+            </a:schemeClr>
+          </a:lnRef>
+          <a:fillRef idx="1">
+            <a:schemeClr val="accent1"/>
+          </a:fillRef>
+          <a:effectRef idx="0">
+            <a:schemeClr val="accent1"/>
+          </a:effectRef>
+          <a:fontRef idx="minor">
+            <a:schemeClr val="lt1"/>
+          </a:fontRef>
+        </p:style>
+        <p:txBody>
+          <a:bodyPr rot="0" spcFirstLastPara="0" vertOverflow="overflow" horzOverflow="overflow" vert="horz" wrap="square" lIns="91440" tIns="45720" rIns="91440" bIns="45720" numCol="1" spcCol="0" rtlCol="0" fromWordArt="0" anchor="ctr" anchorCtr="0" forceAA="0" compatLnSpc="1">
+            <a:prstTxWarp prst="textNoShape">
+              <a:avLst/>
+            </a:prstTxWarp>
+            <a:noAutofit/>
+          </a:bodyPr>
+          <a:lstStyle/>
+          <a:p>
+            <a:pPr algn="ctr"/>
+            <a:r>
+              <a:rPr lang="de-DE" sz="1400" dirty="0">
+                <a:solidFill>
+                  <a:schemeClr val="bg1">
+                    <a:lumMod val="65000"/>
+                  </a:schemeClr>
+                </a:solidFill>
+              </a:rPr>
+              <a:t>Situation</a:t>
+            </a:r>
+          </a:p>
+        </p:txBody>
+      </p:sp>
+      <p:pic>
+        <p:nvPicPr>
+          <p:cNvPr id="12" name="Grafik 11" descr="AutoTS__Praesentation_Beispielgraph_2_mit_Auswahl.png"/>
+          <p:cNvPicPr>
+            <a:picLocks noChangeAspect="1"/>
+          </p:cNvPicPr>
+          <p:nvPr/>
+        </p:nvPicPr>
+        <p:blipFill>
+          <a:blip r:embed="rId2" cstate="print"/>
+          <a:stretch>
+            <a:fillRect/>
+          </a:stretch>
+        </p:blipFill>
+        <p:spPr>
+          <a:xfrm>
+            <a:off x="1151620" y="2424515"/>
+            <a:ext cx="6840760" cy="3751016"/>
+          </a:xfrm>
+          <a:prstGeom prst="rect">
+            <a:avLst/>
+          </a:prstGeom>
+        </p:spPr>
+      </p:pic>
+    </p:spTree>
+    <p:extLst>
+      <p:ext uri="{BB962C8B-B14F-4D97-AF65-F5344CB8AC3E}">
+        <p14:creationId xmlns:p14="http://schemas.microsoft.com/office/powerpoint/2010/main" xmlns="" val="3359108963"/>
+      </p:ext>
+    </p:extLst>
+  </p:cSld>
+  <p:clrMapOvr>
+    <a:masterClrMapping/>
+  </p:clrMapOvr>
+  <p:timing>
+    <p:tnLst>
+      <p:par>
+        <p:cTn id="1" dur="indefinite" restart="never" nodeType="tmRoot"/>
+      </p:par>
+    </p:tnLst>
+  </p:timing>
+</p:sld>
+</file>
+
+<file path=ppt/slides/slide14.xml><?xml version="1.0" encoding="utf-8"?>
+<p:sld xmlns:a="http://schemas.openxmlformats.org/drawingml/2006/main" xmlns:r="http://schemas.openxmlformats.org/officeDocument/2006/relationships" xmlns:p="http://schemas.openxmlformats.org/presentationml/2006/main">
+  <p:cSld>
+    <p:spTree>
+      <p:nvGrpSpPr>
+        <p:cNvPr id="1" name=""/>
+        <p:cNvGrpSpPr/>
+        <p:nvPr/>
+      </p:nvGrpSpPr>
+      <p:grpSpPr>
+        <a:xfrm>
+          <a:off x="0" y="0"/>
+          <a:ext cx="0" cy="0"/>
+          <a:chOff x="0" y="0"/>
+          <a:chExt cx="0" cy="0"/>
+        </a:xfrm>
+      </p:grpSpPr>
+      <p:sp>
+        <p:nvSpPr>
+          <p:cNvPr id="2" name="Titel 1">
+            <a:extLst>
+              <a:ext uri="{FF2B5EF4-FFF2-40B4-BE49-F238E27FC236}">
+                <a16:creationId xmlns:a16="http://schemas.microsoft.com/office/drawing/2014/main" xmlns="" id="{594F37A0-8FD9-42A4-A80F-4C479182787E}"/>
+              </a:ext>
+            </a:extLst>
+          </p:cNvPr>
+          <p:cNvSpPr>
+            <a:spLocks noGrp="1"/>
+          </p:cNvSpPr>
+          <p:nvPr>
+            <p:ph type="title"/>
+          </p:nvPr>
+        </p:nvSpPr>
+        <p:spPr/>
+        <p:txBody>
+          <a:bodyPr/>
+          <a:lstStyle/>
+          <a:p>
+            <a:r>
+              <a:rPr lang="en-US" dirty="0" smtClean="0"/>
+              <a:t>Step 3 – Creating summaries from hierarchies</a:t>
+            </a:r>
+            <a:endParaRPr lang="en-US" dirty="0"/>
+          </a:p>
+        </p:txBody>
+      </p:sp>
+      <p:sp>
+        <p:nvSpPr>
+          <p:cNvPr id="3" name="Inhaltsplatzhalter 2">
+            <a:extLst>
+              <a:ext uri="{FF2B5EF4-FFF2-40B4-BE49-F238E27FC236}">
+                <a16:creationId xmlns:a16="http://schemas.microsoft.com/office/drawing/2014/main" xmlns="" id="{B201CE33-F1D7-423B-B373-1D449812B3D5}"/>
+              </a:ext>
+            </a:extLst>
+          </p:cNvPr>
+          <p:cNvSpPr>
+            <a:spLocks noGrp="1"/>
+          </p:cNvSpPr>
+          <p:nvPr>
+            <p:ph idx="1"/>
+          </p:nvPr>
+        </p:nvSpPr>
+        <p:spPr/>
+        <p:txBody>
+          <a:bodyPr/>
+          <a:lstStyle/>
+          <a:p>
+            <a:pPr>
+              <a:buFont typeface="Arial" pitchFamily="34" charset="0"/>
+              <a:buChar char="•"/>
+            </a:pPr>
+            <a:r>
+              <a:rPr lang="de-DE" dirty="0" err="1" smtClean="0"/>
+              <a:t>select</a:t>
+            </a:r>
+            <a:r>
+              <a:rPr lang="de-DE" dirty="0" smtClean="0"/>
+              <a:t> </a:t>
+            </a:r>
+            <a:r>
+              <a:rPr lang="de-DE" dirty="0" err="1" smtClean="0"/>
+              <a:t>shortest</a:t>
+            </a:r>
+            <a:r>
+              <a:rPr lang="de-DE" dirty="0" smtClean="0"/>
+              <a:t> </a:t>
+            </a:r>
+            <a:r>
+              <a:rPr lang="de-DE" dirty="0" err="1" smtClean="0"/>
+              <a:t>sentences</a:t>
+            </a:r>
+            <a:r>
+              <a:rPr lang="de-DE" dirty="0" smtClean="0"/>
+              <a:t> </a:t>
+            </a:r>
+            <a:r>
+              <a:rPr lang="de-DE" dirty="0" err="1" smtClean="0"/>
+              <a:t>from</a:t>
+            </a:r>
+            <a:r>
+              <a:rPr lang="de-DE" dirty="0" smtClean="0"/>
+              <a:t> </a:t>
+            </a:r>
+            <a:r>
+              <a:rPr lang="de-DE" dirty="0" err="1" smtClean="0"/>
+              <a:t>root</a:t>
+            </a:r>
+            <a:r>
+              <a:rPr lang="de-DE" dirty="0" smtClean="0"/>
+              <a:t> </a:t>
+            </a:r>
+            <a:r>
+              <a:rPr lang="de-DE" dirty="0" err="1" smtClean="0"/>
+              <a:t>bubbles</a:t>
+            </a:r>
+            <a:r>
+              <a:rPr lang="de-DE" dirty="0" smtClean="0"/>
+              <a:t> </a:t>
+            </a:r>
+            <a:r>
+              <a:rPr lang="de-DE" dirty="0" err="1" smtClean="0"/>
+              <a:t>of</a:t>
+            </a:r>
+            <a:r>
+              <a:rPr lang="de-DE" dirty="0" smtClean="0"/>
+              <a:t> </a:t>
+            </a:r>
+            <a:r>
+              <a:rPr lang="de-DE" dirty="0" err="1" smtClean="0"/>
+              <a:t>the</a:t>
+            </a:r>
+            <a:r>
+              <a:rPr lang="de-DE" dirty="0" smtClean="0"/>
+              <a:t> </a:t>
+            </a:r>
+            <a:r>
+              <a:rPr lang="de-DE" dirty="0" err="1" smtClean="0"/>
+              <a:t>largest</a:t>
+            </a:r>
+            <a:r>
+              <a:rPr lang="de-DE" dirty="0" smtClean="0"/>
+              <a:t> </a:t>
+            </a:r>
+            <a:r>
+              <a:rPr lang="de-DE" dirty="0" err="1" smtClean="0"/>
+              <a:t>trees</a:t>
+            </a:r>
+            <a:endParaRPr lang="de-DE" dirty="0"/>
+          </a:p>
+        </p:txBody>
+      </p:sp>
+      <p:sp>
+        <p:nvSpPr>
+          <p:cNvPr id="5" name="Pfeil: Chevron 4">
+            <a:extLst>
+              <a:ext uri="{FF2B5EF4-FFF2-40B4-BE49-F238E27FC236}">
+                <a16:creationId xmlns:a16="http://schemas.microsoft.com/office/drawing/2014/main" xmlns="" id="{FE16A436-3EBF-406A-A452-2785E92CA870}"/>
+              </a:ext>
+            </a:extLst>
+          </p:cNvPr>
+          <p:cNvSpPr/>
+          <p:nvPr/>
+        </p:nvSpPr>
+        <p:spPr>
+          <a:xfrm>
+            <a:off x="2483343" y="1591446"/>
+            <a:ext cx="2160000" cy="270000"/>
+          </a:xfrm>
+          <a:prstGeom prst="chevron">
+            <a:avLst/>
+          </a:prstGeom>
+          <a:solidFill>
+            <a:schemeClr val="bg1"/>
+          </a:solidFill>
+          <a:ln w="6350">
+            <a:solidFill>
+              <a:schemeClr val="bg1">
+                <a:lumMod val="65000"/>
+              </a:schemeClr>
+            </a:solidFill>
+          </a:ln>
+        </p:spPr>
+        <p:style>
+          <a:lnRef idx="2">
+            <a:schemeClr val="accent1">
+              <a:shade val="50000"/>
+            </a:schemeClr>
+          </a:lnRef>
+          <a:fillRef idx="1">
+            <a:schemeClr val="accent1"/>
+          </a:fillRef>
+          <a:effectRef idx="0">
+            <a:schemeClr val="accent1"/>
+          </a:effectRef>
+          <a:fontRef idx="minor">
+            <a:schemeClr val="lt1"/>
+          </a:fontRef>
+        </p:style>
+        <p:txBody>
+          <a:bodyPr rot="0" spcFirstLastPara="0" vertOverflow="overflow" horzOverflow="overflow" vert="horz" wrap="square" lIns="91440" tIns="45720" rIns="91440" bIns="45720" numCol="1" spcCol="0" rtlCol="0" fromWordArt="0" anchor="ctr" anchorCtr="0" forceAA="0" compatLnSpc="1">
+            <a:prstTxWarp prst="textNoShape">
+              <a:avLst/>
+            </a:prstTxWarp>
+            <a:noAutofit/>
+          </a:bodyPr>
+          <a:lstStyle/>
+          <a:p>
+            <a:pPr algn="ctr"/>
+            <a:r>
+              <a:rPr lang="de-DE" sz="1400" dirty="0">
+                <a:solidFill>
+                  <a:schemeClr val="bg1">
+                    <a:lumMod val="65000"/>
+                  </a:schemeClr>
+                </a:solidFill>
+              </a:rPr>
+              <a:t>Task</a:t>
+            </a:r>
+          </a:p>
+        </p:txBody>
+      </p:sp>
+      <p:sp>
+        <p:nvSpPr>
+          <p:cNvPr id="6" name="Pfeil: Chevron 5">
+            <a:extLst>
+              <a:ext uri="{FF2B5EF4-FFF2-40B4-BE49-F238E27FC236}">
+                <a16:creationId xmlns:a16="http://schemas.microsoft.com/office/drawing/2014/main" xmlns="" id="{4B425B4C-53B0-4FDA-90C8-3EAE519EFFB2}"/>
+              </a:ext>
+            </a:extLst>
+          </p:cNvPr>
+          <p:cNvSpPr/>
+          <p:nvPr/>
+        </p:nvSpPr>
+        <p:spPr>
+          <a:xfrm>
+            <a:off x="4607912" y="1591446"/>
+            <a:ext cx="2160000" cy="270000"/>
+          </a:xfrm>
+          <a:prstGeom prst="chevron">
+            <a:avLst/>
+          </a:prstGeom>
+          <a:solidFill>
+            <a:srgbClr val="9C1C26"/>
+          </a:solidFill>
+          <a:ln w="6350">
+            <a:solidFill>
+              <a:schemeClr val="tx1"/>
+            </a:solidFill>
+          </a:ln>
+        </p:spPr>
+        <p:style>
+          <a:lnRef idx="2">
+            <a:schemeClr val="accent1">
+              <a:shade val="50000"/>
+            </a:schemeClr>
+          </a:lnRef>
+          <a:fillRef idx="1">
+            <a:schemeClr val="accent1"/>
+          </a:fillRef>
+          <a:effectRef idx="0">
+            <a:schemeClr val="accent1"/>
+          </a:effectRef>
+          <a:fontRef idx="minor">
+            <a:schemeClr val="lt1"/>
+          </a:fontRef>
+        </p:style>
+        <p:txBody>
+          <a:bodyPr rot="0" spcFirstLastPara="0" vertOverflow="overflow" horzOverflow="overflow" vert="horz" wrap="square" lIns="91440" tIns="45720" rIns="91440" bIns="45720" numCol="1" spcCol="0" rtlCol="0" fromWordArt="0" anchor="ctr" anchorCtr="0" forceAA="0" compatLnSpc="1">
+            <a:prstTxWarp prst="textNoShape">
+              <a:avLst/>
+            </a:prstTxWarp>
+            <a:noAutofit/>
+          </a:bodyPr>
+          <a:lstStyle/>
+          <a:p>
+            <a:pPr algn="ctr"/>
+            <a:r>
+              <a:rPr lang="de-DE" sz="1400" dirty="0">
+                <a:solidFill>
+                  <a:schemeClr val="bg1"/>
+                </a:solidFill>
+              </a:rPr>
+              <a:t>Action</a:t>
+            </a:r>
+          </a:p>
+        </p:txBody>
+      </p:sp>
+      <p:sp>
+        <p:nvSpPr>
+          <p:cNvPr id="7" name="Pfeil: Chevron 6">
+            <a:extLst>
+              <a:ext uri="{FF2B5EF4-FFF2-40B4-BE49-F238E27FC236}">
+                <a16:creationId xmlns:a16="http://schemas.microsoft.com/office/drawing/2014/main" xmlns="" id="{14F5353B-3EA0-4F48-A473-08D522F34D71}"/>
+              </a:ext>
+            </a:extLst>
+          </p:cNvPr>
+          <p:cNvSpPr/>
+          <p:nvPr/>
+        </p:nvSpPr>
+        <p:spPr>
+          <a:xfrm>
+            <a:off x="6732480" y="1591446"/>
+            <a:ext cx="2160000" cy="270000"/>
+          </a:xfrm>
+          <a:prstGeom prst="chevron">
+            <a:avLst/>
+          </a:prstGeom>
+          <a:solidFill>
+            <a:schemeClr val="bg1"/>
+          </a:solidFill>
+          <a:ln w="6350">
+            <a:solidFill>
+              <a:schemeClr val="bg1">
+                <a:lumMod val="65000"/>
+              </a:schemeClr>
+            </a:solidFill>
+          </a:ln>
+        </p:spPr>
+        <p:style>
+          <a:lnRef idx="2">
+            <a:schemeClr val="accent1">
+              <a:shade val="50000"/>
+            </a:schemeClr>
+          </a:lnRef>
+          <a:fillRef idx="1">
+            <a:schemeClr val="accent1"/>
+          </a:fillRef>
+          <a:effectRef idx="0">
+            <a:schemeClr val="accent1"/>
+          </a:effectRef>
+          <a:fontRef idx="minor">
+            <a:schemeClr val="lt1"/>
+          </a:fontRef>
+        </p:style>
+        <p:txBody>
+          <a:bodyPr rot="0" spcFirstLastPara="0" vertOverflow="overflow" horzOverflow="overflow" vert="horz" wrap="square" lIns="91440" tIns="45720" rIns="91440" bIns="45720" numCol="1" spcCol="0" rtlCol="0" fromWordArt="0" anchor="ctr" anchorCtr="0" forceAA="0" compatLnSpc="1">
+            <a:prstTxWarp prst="textNoShape">
+              <a:avLst/>
+            </a:prstTxWarp>
+            <a:noAutofit/>
+          </a:bodyPr>
+          <a:lstStyle/>
+          <a:p>
+            <a:pPr algn="ctr"/>
+            <a:r>
+              <a:rPr lang="de-DE" sz="1400" dirty="0" err="1">
+                <a:solidFill>
+                  <a:schemeClr val="bg1">
+                    <a:lumMod val="65000"/>
+                  </a:schemeClr>
+                </a:solidFill>
+              </a:rPr>
+              <a:t>Result</a:t>
+            </a:r>
+            <a:endParaRPr lang="de-DE" sz="1400" dirty="0">
+              <a:solidFill>
+                <a:schemeClr val="bg1">
+                  <a:lumMod val="65000"/>
+                </a:schemeClr>
+              </a:solidFill>
+            </a:endParaRPr>
+          </a:p>
+        </p:txBody>
+      </p:sp>
+      <p:sp>
+        <p:nvSpPr>
+          <p:cNvPr id="8" name="Pfeil: Chevron 7">
+            <a:extLst>
+              <a:ext uri="{FF2B5EF4-FFF2-40B4-BE49-F238E27FC236}">
+                <a16:creationId xmlns:a16="http://schemas.microsoft.com/office/drawing/2014/main" xmlns="" id="{655E865C-680E-47F4-9F87-B4EB179E321D}"/>
+              </a:ext>
+            </a:extLst>
+          </p:cNvPr>
+          <p:cNvSpPr/>
+          <p:nvPr/>
+        </p:nvSpPr>
+        <p:spPr>
+          <a:xfrm>
+            <a:off x="358774" y="1591446"/>
+            <a:ext cx="2160000" cy="270000"/>
+          </a:xfrm>
+          <a:prstGeom prst="chevron">
+            <a:avLst/>
+          </a:prstGeom>
+          <a:solidFill>
+            <a:schemeClr val="bg1"/>
+          </a:solidFill>
+          <a:ln w="6350">
+            <a:solidFill>
+              <a:schemeClr val="bg1">
+                <a:lumMod val="65000"/>
+              </a:schemeClr>
+            </a:solidFill>
+          </a:ln>
+        </p:spPr>
+        <p:style>
+          <a:lnRef idx="2">
+            <a:schemeClr val="accent1">
+              <a:shade val="50000"/>
+            </a:schemeClr>
+          </a:lnRef>
+          <a:fillRef idx="1">
+            <a:schemeClr val="accent1"/>
+          </a:fillRef>
+          <a:effectRef idx="0">
+            <a:schemeClr val="accent1"/>
+          </a:effectRef>
+          <a:fontRef idx="minor">
+            <a:schemeClr val="lt1"/>
+          </a:fontRef>
+        </p:style>
+        <p:txBody>
+          <a:bodyPr rot="0" spcFirstLastPara="0" vertOverflow="overflow" horzOverflow="overflow" vert="horz" wrap="square" lIns="91440" tIns="45720" rIns="91440" bIns="45720" numCol="1" spcCol="0" rtlCol="0" fromWordArt="0" anchor="ctr" anchorCtr="0" forceAA="0" compatLnSpc="1">
+            <a:prstTxWarp prst="textNoShape">
+              <a:avLst/>
+            </a:prstTxWarp>
+            <a:noAutofit/>
+          </a:bodyPr>
+          <a:lstStyle/>
+          <a:p>
+            <a:pPr algn="ctr"/>
+            <a:r>
+              <a:rPr lang="de-DE" sz="1400" dirty="0">
+                <a:solidFill>
+                  <a:schemeClr val="bg1">
+                    <a:lumMod val="65000"/>
+                  </a:schemeClr>
+                </a:solidFill>
+              </a:rPr>
+              <a:t>Situation</a:t>
+            </a:r>
+          </a:p>
+        </p:txBody>
+      </p:sp>
+      <p:pic>
+        <p:nvPicPr>
+          <p:cNvPr id="12" name="Grafik 11" descr="AutoTS__Praesentation_Beispielgraph_2_mit_Auswahl.png"/>
+          <p:cNvPicPr>
+            <a:picLocks noChangeAspect="1"/>
+          </p:cNvPicPr>
+          <p:nvPr/>
+        </p:nvPicPr>
+        <p:blipFill>
+          <a:blip r:embed="rId2" cstate="print"/>
+          <a:stretch>
+            <a:fillRect/>
+          </a:stretch>
+        </p:blipFill>
+        <p:spPr>
+          <a:xfrm>
+            <a:off x="1151620" y="2420889"/>
+            <a:ext cx="6840759" cy="3758268"/>
+          </a:xfrm>
+          <a:prstGeom prst="rect">
+            <a:avLst/>
+          </a:prstGeom>
+        </p:spPr>
+      </p:pic>
+    </p:spTree>
+    <p:extLst>
+      <p:ext uri="{BB962C8B-B14F-4D97-AF65-F5344CB8AC3E}">
+        <p14:creationId xmlns:p14="http://schemas.microsoft.com/office/powerpoint/2010/main" xmlns="" val="3359108963"/>
+      </p:ext>
+    </p:extLst>
+  </p:cSld>
+  <p:clrMapOvr>
+    <a:masterClrMapping/>
+  </p:clrMapOvr>
+  <p:timing>
+    <p:tnLst>
+      <p:par>
+        <p:cTn id="1" dur="indefinite" restart="never" nodeType="tmRoot"/>
+      </p:par>
+    </p:tnLst>
+  </p:timing>
+</p:sld>
+</file>
+
+<file path=ppt/slides/slide15.xml><?xml version="1.0" encoding="utf-8"?>
+<p:sld xmlns:a="http://schemas.openxmlformats.org/drawingml/2006/main" xmlns:r="http://schemas.openxmlformats.org/officeDocument/2006/relationships" xmlns:p="http://schemas.openxmlformats.org/presentationml/2006/main">
+  <p:cSld>
+    <p:spTree>
+      <p:nvGrpSpPr>
+        <p:cNvPr id="1" name=""/>
+        <p:cNvGrpSpPr/>
+        <p:nvPr/>
+      </p:nvGrpSpPr>
+      <p:grpSpPr>
+        <a:xfrm>
+          <a:off x="0" y="0"/>
+          <a:ext cx="0" cy="0"/>
+          <a:chOff x="0" y="0"/>
+          <a:chExt cx="0" cy="0"/>
+        </a:xfrm>
+      </p:grpSpPr>
+      <p:sp>
+        <p:nvSpPr>
+          <p:cNvPr id="2" name="Titel 1">
+            <a:extLst>
+              <a:ext uri="{FF2B5EF4-FFF2-40B4-BE49-F238E27FC236}">
+                <a16:creationId xmlns:a16="http://schemas.microsoft.com/office/drawing/2014/main" xmlns="" id="{594F37A0-8FD9-42A4-A80F-4C479182787E}"/>
+              </a:ext>
+            </a:extLst>
+          </p:cNvPr>
+          <p:cNvSpPr>
+            <a:spLocks noGrp="1"/>
+          </p:cNvSpPr>
+          <p:nvPr>
+            <p:ph type="title"/>
+          </p:nvPr>
+        </p:nvSpPr>
+        <p:spPr/>
+        <p:txBody>
+          <a:bodyPr/>
+          <a:lstStyle/>
+          <a:p>
+            <a:r>
+              <a:rPr lang="en-US" dirty="0" smtClean="0"/>
+              <a:t>Step 3 – Creating summaries from hierarchies</a:t>
+            </a:r>
+            <a:endParaRPr lang="en-US" dirty="0"/>
+          </a:p>
+        </p:txBody>
+      </p:sp>
+      <p:sp>
+        <p:nvSpPr>
+          <p:cNvPr id="3" name="Inhaltsplatzhalter 2">
+            <a:extLst>
+              <a:ext uri="{FF2B5EF4-FFF2-40B4-BE49-F238E27FC236}">
+                <a16:creationId xmlns:a16="http://schemas.microsoft.com/office/drawing/2014/main" xmlns="" id="{B201CE33-F1D7-423B-B373-1D449812B3D5}"/>
+              </a:ext>
+            </a:extLst>
+          </p:cNvPr>
+          <p:cNvSpPr>
+            <a:spLocks noGrp="1"/>
+          </p:cNvSpPr>
+          <p:nvPr>
+            <p:ph idx="1"/>
+          </p:nvPr>
+        </p:nvSpPr>
+        <p:spPr/>
+        <p:txBody>
+          <a:bodyPr/>
+          <a:lstStyle/>
+          <a:p>
+            <a:endParaRPr lang="de-DE" dirty="0"/>
+          </a:p>
+        </p:txBody>
+      </p:sp>
+      <p:sp>
+        <p:nvSpPr>
+          <p:cNvPr id="5" name="Pfeil: Chevron 4">
+            <a:extLst>
+              <a:ext uri="{FF2B5EF4-FFF2-40B4-BE49-F238E27FC236}">
+                <a16:creationId xmlns:a16="http://schemas.microsoft.com/office/drawing/2014/main" xmlns="" id="{FE16A436-3EBF-406A-A452-2785E92CA870}"/>
+              </a:ext>
+            </a:extLst>
+          </p:cNvPr>
+          <p:cNvSpPr/>
+          <p:nvPr/>
+        </p:nvSpPr>
+        <p:spPr>
+          <a:xfrm>
+            <a:off x="2483343" y="1591446"/>
+            <a:ext cx="2160000" cy="270000"/>
+          </a:xfrm>
+          <a:prstGeom prst="chevron">
+            <a:avLst/>
+          </a:prstGeom>
+          <a:solidFill>
+            <a:schemeClr val="bg1"/>
+          </a:solidFill>
+          <a:ln w="6350">
+            <a:solidFill>
+              <a:schemeClr val="bg1">
+                <a:lumMod val="65000"/>
+              </a:schemeClr>
+            </a:solidFill>
+          </a:ln>
+        </p:spPr>
+        <p:style>
+          <a:lnRef idx="2">
+            <a:schemeClr val="accent1">
+              <a:shade val="50000"/>
+            </a:schemeClr>
+          </a:lnRef>
+          <a:fillRef idx="1">
+            <a:schemeClr val="accent1"/>
+          </a:fillRef>
+          <a:effectRef idx="0">
+            <a:schemeClr val="accent1"/>
+          </a:effectRef>
+          <a:fontRef idx="minor">
+            <a:schemeClr val="lt1"/>
+          </a:fontRef>
+        </p:style>
+        <p:txBody>
+          <a:bodyPr rot="0" spcFirstLastPara="0" vertOverflow="overflow" horzOverflow="overflow" vert="horz" wrap="square" lIns="91440" tIns="45720" rIns="91440" bIns="45720" numCol="1" spcCol="0" rtlCol="0" fromWordArt="0" anchor="ctr" anchorCtr="0" forceAA="0" compatLnSpc="1">
+            <a:prstTxWarp prst="textNoShape">
+              <a:avLst/>
+            </a:prstTxWarp>
+            <a:noAutofit/>
+          </a:bodyPr>
+          <a:lstStyle/>
+          <a:p>
+            <a:pPr algn="ctr"/>
+            <a:r>
+              <a:rPr lang="de-DE" sz="1400" dirty="0">
+                <a:solidFill>
+                  <a:schemeClr val="bg1">
+                    <a:lumMod val="65000"/>
+                  </a:schemeClr>
+                </a:solidFill>
+              </a:rPr>
+              <a:t>Task</a:t>
+            </a:r>
+          </a:p>
+        </p:txBody>
+      </p:sp>
+      <p:sp>
+        <p:nvSpPr>
+          <p:cNvPr id="6" name="Pfeil: Chevron 5">
+            <a:extLst>
+              <a:ext uri="{FF2B5EF4-FFF2-40B4-BE49-F238E27FC236}">
+                <a16:creationId xmlns:a16="http://schemas.microsoft.com/office/drawing/2014/main" xmlns="" id="{4B425B4C-53B0-4FDA-90C8-3EAE519EFFB2}"/>
+              </a:ext>
+            </a:extLst>
+          </p:cNvPr>
+          <p:cNvSpPr/>
+          <p:nvPr/>
+        </p:nvSpPr>
+        <p:spPr>
+          <a:xfrm>
+            <a:off x="4607912" y="1591446"/>
+            <a:ext cx="2160000" cy="270000"/>
+          </a:xfrm>
+          <a:prstGeom prst="chevron">
+            <a:avLst/>
+          </a:prstGeom>
+          <a:solidFill>
+            <a:srgbClr val="9C1C26"/>
+          </a:solidFill>
+          <a:ln w="6350">
+            <a:solidFill>
+              <a:schemeClr val="tx1"/>
+            </a:solidFill>
+          </a:ln>
+        </p:spPr>
+        <p:style>
+          <a:lnRef idx="2">
+            <a:schemeClr val="accent1">
+              <a:shade val="50000"/>
+            </a:schemeClr>
+          </a:lnRef>
+          <a:fillRef idx="1">
+            <a:schemeClr val="accent1"/>
+          </a:fillRef>
+          <a:effectRef idx="0">
+            <a:schemeClr val="accent1"/>
+          </a:effectRef>
+          <a:fontRef idx="minor">
+            <a:schemeClr val="lt1"/>
+          </a:fontRef>
+        </p:style>
+        <p:txBody>
+          <a:bodyPr rot="0" spcFirstLastPara="0" vertOverflow="overflow" horzOverflow="overflow" vert="horz" wrap="square" lIns="91440" tIns="45720" rIns="91440" bIns="45720" numCol="1" spcCol="0" rtlCol="0" fromWordArt="0" anchor="ctr" anchorCtr="0" forceAA="0" compatLnSpc="1">
+            <a:prstTxWarp prst="textNoShape">
+              <a:avLst/>
+            </a:prstTxWarp>
+            <a:noAutofit/>
+          </a:bodyPr>
+          <a:lstStyle/>
+          <a:p>
+            <a:pPr algn="ctr"/>
+            <a:r>
+              <a:rPr lang="de-DE" sz="1400" dirty="0">
+                <a:solidFill>
+                  <a:schemeClr val="bg1"/>
+                </a:solidFill>
+              </a:rPr>
+              <a:t>Action</a:t>
+            </a:r>
+          </a:p>
+        </p:txBody>
+      </p:sp>
+      <p:sp>
+        <p:nvSpPr>
+          <p:cNvPr id="7" name="Pfeil: Chevron 6">
+            <a:extLst>
+              <a:ext uri="{FF2B5EF4-FFF2-40B4-BE49-F238E27FC236}">
+                <a16:creationId xmlns:a16="http://schemas.microsoft.com/office/drawing/2014/main" xmlns="" id="{14F5353B-3EA0-4F48-A473-08D522F34D71}"/>
+              </a:ext>
+            </a:extLst>
+          </p:cNvPr>
+          <p:cNvSpPr/>
+          <p:nvPr/>
+        </p:nvSpPr>
+        <p:spPr>
+          <a:xfrm>
+            <a:off x="6732480" y="1591446"/>
+            <a:ext cx="2160000" cy="270000"/>
+          </a:xfrm>
+          <a:prstGeom prst="chevron">
+            <a:avLst/>
+          </a:prstGeom>
+          <a:solidFill>
+            <a:schemeClr val="bg1"/>
+          </a:solidFill>
+          <a:ln w="6350">
+            <a:solidFill>
+              <a:schemeClr val="bg1">
+                <a:lumMod val="65000"/>
+              </a:schemeClr>
+            </a:solidFill>
+          </a:ln>
+        </p:spPr>
+        <p:style>
+          <a:lnRef idx="2">
+            <a:schemeClr val="accent1">
+              <a:shade val="50000"/>
+            </a:schemeClr>
+          </a:lnRef>
+          <a:fillRef idx="1">
+            <a:schemeClr val="accent1"/>
+          </a:fillRef>
+          <a:effectRef idx="0">
+            <a:schemeClr val="accent1"/>
+          </a:effectRef>
+          <a:fontRef idx="minor">
+            <a:schemeClr val="lt1"/>
+          </a:fontRef>
+        </p:style>
+        <p:txBody>
+          <a:bodyPr rot="0" spcFirstLastPara="0" vertOverflow="overflow" horzOverflow="overflow" vert="horz" wrap="square" lIns="91440" tIns="45720" rIns="91440" bIns="45720" numCol="1" spcCol="0" rtlCol="0" fromWordArt="0" anchor="ctr" anchorCtr="0" forceAA="0" compatLnSpc="1">
+            <a:prstTxWarp prst="textNoShape">
+              <a:avLst/>
+            </a:prstTxWarp>
+            <a:noAutofit/>
+          </a:bodyPr>
+          <a:lstStyle/>
+          <a:p>
+            <a:pPr algn="ctr"/>
+            <a:r>
+              <a:rPr lang="de-DE" sz="1400" dirty="0" err="1">
+                <a:solidFill>
+                  <a:schemeClr val="bg1">
+                    <a:lumMod val="65000"/>
+                  </a:schemeClr>
+                </a:solidFill>
+              </a:rPr>
+              <a:t>Result</a:t>
+            </a:r>
+            <a:endParaRPr lang="de-DE" sz="1400" dirty="0">
+              <a:solidFill>
+                <a:schemeClr val="bg1">
+                  <a:lumMod val="65000"/>
+                </a:schemeClr>
+              </a:solidFill>
+            </a:endParaRPr>
+          </a:p>
+        </p:txBody>
+      </p:sp>
+      <p:sp>
+        <p:nvSpPr>
+          <p:cNvPr id="8" name="Pfeil: Chevron 7">
+            <a:extLst>
+              <a:ext uri="{FF2B5EF4-FFF2-40B4-BE49-F238E27FC236}">
+                <a16:creationId xmlns:a16="http://schemas.microsoft.com/office/drawing/2014/main" xmlns="" id="{655E865C-680E-47F4-9F87-B4EB179E321D}"/>
+              </a:ext>
+            </a:extLst>
+          </p:cNvPr>
+          <p:cNvSpPr/>
+          <p:nvPr/>
+        </p:nvSpPr>
+        <p:spPr>
+          <a:xfrm>
+            <a:off x="358774" y="1591446"/>
+            <a:ext cx="2160000" cy="270000"/>
+          </a:xfrm>
+          <a:prstGeom prst="chevron">
+            <a:avLst/>
+          </a:prstGeom>
+          <a:solidFill>
+            <a:schemeClr val="bg1"/>
+          </a:solidFill>
+          <a:ln w="6350">
+            <a:solidFill>
+              <a:schemeClr val="bg1">
+                <a:lumMod val="65000"/>
+              </a:schemeClr>
+            </a:solidFill>
+          </a:ln>
+        </p:spPr>
+        <p:style>
+          <a:lnRef idx="2">
+            <a:schemeClr val="accent1">
+              <a:shade val="50000"/>
+            </a:schemeClr>
+          </a:lnRef>
+          <a:fillRef idx="1">
+            <a:schemeClr val="accent1"/>
+          </a:fillRef>
+          <a:effectRef idx="0">
+            <a:schemeClr val="accent1"/>
+          </a:effectRef>
+          <a:fontRef idx="minor">
+            <a:schemeClr val="lt1"/>
+          </a:fontRef>
+        </p:style>
+        <p:txBody>
+          <a:bodyPr rot="0" spcFirstLastPara="0" vertOverflow="overflow" horzOverflow="overflow" vert="horz" wrap="square" lIns="91440" tIns="45720" rIns="91440" bIns="45720" numCol="1" spcCol="0" rtlCol="0" fromWordArt="0" anchor="ctr" anchorCtr="0" forceAA="0" compatLnSpc="1">
+            <a:prstTxWarp prst="textNoShape">
+              <a:avLst/>
+            </a:prstTxWarp>
+            <a:noAutofit/>
+          </a:bodyPr>
+          <a:lstStyle/>
+          <a:p>
+            <a:pPr algn="ctr"/>
+            <a:r>
+              <a:rPr lang="de-DE" sz="1400" dirty="0">
+                <a:solidFill>
+                  <a:schemeClr val="bg1">
+                    <a:lumMod val="65000"/>
+                  </a:schemeClr>
+                </a:solidFill>
+              </a:rPr>
+              <a:t>Situation</a:t>
+            </a:r>
+          </a:p>
+        </p:txBody>
+      </p:sp>
+    </p:spTree>
+    <p:extLst>
+      <p:ext uri="{BB962C8B-B14F-4D97-AF65-F5344CB8AC3E}">
+        <p14:creationId xmlns:p14="http://schemas.microsoft.com/office/powerpoint/2010/main" xmlns="" val="3359108963"/>
+      </p:ext>
+    </p:extLst>
+  </p:cSld>
+  <p:clrMapOvr>
+    <a:masterClrMapping/>
+  </p:clrMapOvr>
+  <p:timing>
+    <p:tnLst>
+      <p:par>
+        <p:cTn id="1" dur="indefinite" restart="never" nodeType="tmRoot"/>
+      </p:par>
+    </p:tnLst>
+  </p:timing>
+</p:sld>
+</file>
+
+<file path=ppt/slides/slide16.xml><?xml version="1.0" encoding="utf-8"?>
+<p:sld xmlns:a="http://schemas.openxmlformats.org/drawingml/2006/main" xmlns:r="http://schemas.openxmlformats.org/officeDocument/2006/relationships" xmlns:p="http://schemas.openxmlformats.org/presentationml/2006/main">
+  <p:cSld>
+    <p:spTree>
+      <p:nvGrpSpPr>
+        <p:cNvPr id="1" name=""/>
+        <p:cNvGrpSpPr/>
+        <p:nvPr/>
+      </p:nvGrpSpPr>
+      <p:grpSpPr>
+        <a:xfrm>
+          <a:off x="0" y="0"/>
+          <a:ext cx="0" cy="0"/>
+          <a:chOff x="0" y="0"/>
+          <a:chExt cx="0" cy="0"/>
+        </a:xfrm>
+      </p:grpSpPr>
+      <p:sp>
+        <p:nvSpPr>
+          <p:cNvPr id="2" name="Titel 1">
+            <a:extLst>
+              <a:ext uri="{FF2B5EF4-FFF2-40B4-BE49-F238E27FC236}">
+                <a16:creationId xmlns:a16="http://schemas.microsoft.com/office/drawing/2014/main" xmlns="" id="{ECD13983-53CB-41A8-9897-E4D20881F929}"/>
+              </a:ext>
+            </a:extLst>
+          </p:cNvPr>
+          <p:cNvSpPr>
+            <a:spLocks noGrp="1"/>
+          </p:cNvSpPr>
+          <p:nvPr>
+            <p:ph type="title"/>
+          </p:nvPr>
+        </p:nvSpPr>
+        <p:spPr/>
+        <p:txBody>
+          <a:bodyPr/>
+          <a:lstStyle/>
+          <a:p>
+            <a:r>
+              <a:rPr lang="de-DE" dirty="0" err="1"/>
+              <a:t>Result</a:t>
+            </a:r>
+            <a:endParaRPr lang="de-DE" dirty="0"/>
+          </a:p>
+        </p:txBody>
+      </p:sp>
+      <p:sp>
+        <p:nvSpPr>
+          <p:cNvPr id="3" name="Textplatzhalter 2">
+            <a:extLst>
+              <a:ext uri="{FF2B5EF4-FFF2-40B4-BE49-F238E27FC236}">
+                <a16:creationId xmlns:a16="http://schemas.microsoft.com/office/drawing/2014/main" xmlns="" id="{8A82E612-E974-4DE0-823F-A661C5C288BB}"/>
+              </a:ext>
+            </a:extLst>
+          </p:cNvPr>
+          <p:cNvSpPr>
+            <a:spLocks noGrp="1"/>
+          </p:cNvSpPr>
+          <p:nvPr>
+            <p:ph type="body" idx="1"/>
+          </p:nvPr>
+        </p:nvSpPr>
+        <p:spPr/>
+        <p:txBody>
+          <a:bodyPr/>
+          <a:lstStyle/>
+          <a:p>
+            <a:endParaRPr lang="de-DE" dirty="0"/>
+          </a:p>
+        </p:txBody>
+      </p:sp>
+    </p:spTree>
+    <p:extLst>
+      <p:ext uri="{BB962C8B-B14F-4D97-AF65-F5344CB8AC3E}">
+        <p14:creationId xmlns:p14="http://schemas.microsoft.com/office/powerpoint/2010/main" xmlns="" val="140067109"/>
+      </p:ext>
+    </p:extLst>
+  </p:cSld>
+  <p:clrMapOvr>
+    <a:masterClrMapping/>
+  </p:clrMapOvr>
+  <p:timing>
+    <p:tnLst>
+      <p:par>
+        <p:cTn id="1" dur="indefinite" restart="never" nodeType="tmRoot"/>
+      </p:par>
+    </p:tnLst>
+  </p:timing>
+</p:sld>
+</file>
+
+<file path=ppt/slides/slide17.xml><?xml version="1.0" encoding="utf-8"?>
+<p:sld xmlns:a="http://schemas.openxmlformats.org/drawingml/2006/main" xmlns:r="http://schemas.openxmlformats.org/officeDocument/2006/relationships" xmlns:p="http://schemas.openxmlformats.org/presentationml/2006/main">
+  <p:cSld>
+    <p:spTree>
+      <p:nvGrpSpPr>
+        <p:cNvPr id="1" name=""/>
+        <p:cNvGrpSpPr/>
+        <p:nvPr/>
+      </p:nvGrpSpPr>
+      <p:grpSpPr>
+        <a:xfrm>
+          <a:off x="0" y="0"/>
+          <a:ext cx="0" cy="0"/>
+          <a:chOff x="0" y="0"/>
+          <a:chExt cx="0" cy="0"/>
+        </a:xfrm>
+      </p:grpSpPr>
+      <p:sp>
+        <p:nvSpPr>
+          <p:cNvPr id="2" name="Titel 1">
+            <a:extLst>
+              <a:ext uri="{FF2B5EF4-FFF2-40B4-BE49-F238E27FC236}">
+                <a16:creationId xmlns:a16="http://schemas.microsoft.com/office/drawing/2014/main" xmlns="" id="{594F37A0-8FD9-42A4-A80F-4C479182787E}"/>
+              </a:ext>
+            </a:extLst>
+          </p:cNvPr>
+          <p:cNvSpPr>
+            <a:spLocks noGrp="1"/>
+          </p:cNvSpPr>
+          <p:nvPr>
+            <p:ph type="title"/>
+          </p:nvPr>
+        </p:nvSpPr>
+        <p:spPr/>
+        <p:txBody>
+          <a:bodyPr/>
+          <a:lstStyle/>
+          <a:p>
+            <a:r>
+              <a:rPr lang="de-DE" dirty="0" err="1"/>
+              <a:t>evaluation</a:t>
+            </a:r>
+            <a:endParaRPr lang="de-DE" dirty="0"/>
+          </a:p>
+        </p:txBody>
+      </p:sp>
+      <p:sp>
+        <p:nvSpPr>
+          <p:cNvPr id="3" name="Inhaltsplatzhalter 2">
+            <a:extLst>
+              <a:ext uri="{FF2B5EF4-FFF2-40B4-BE49-F238E27FC236}">
+                <a16:creationId xmlns:a16="http://schemas.microsoft.com/office/drawing/2014/main" xmlns="" id="{B201CE33-F1D7-423B-B373-1D449812B3D5}"/>
+              </a:ext>
+            </a:extLst>
+          </p:cNvPr>
+          <p:cNvSpPr>
+            <a:spLocks noGrp="1"/>
+          </p:cNvSpPr>
+          <p:nvPr>
+            <p:ph idx="1"/>
+          </p:nvPr>
+        </p:nvSpPr>
+        <p:spPr/>
+        <p:txBody>
+          <a:bodyPr/>
+          <a:lstStyle/>
+          <a:p>
+            <a:r>
+              <a:rPr lang="de-DE" dirty="0" err="1"/>
+              <a:t>each</a:t>
+            </a:r>
+            <a:r>
+              <a:rPr lang="de-DE" dirty="0"/>
+              <a:t> </a:t>
+            </a:r>
+            <a:r>
+              <a:rPr lang="de-DE" dirty="0" err="1"/>
+              <a:t>of</a:t>
+            </a:r>
+            <a:r>
+              <a:rPr lang="de-DE" dirty="0"/>
+              <a:t> </a:t>
+            </a:r>
+            <a:r>
+              <a:rPr lang="de-DE" dirty="0" err="1"/>
+              <a:t>our</a:t>
+            </a:r>
+            <a:r>
+              <a:rPr lang="de-DE" dirty="0"/>
+              <a:t> </a:t>
+            </a:r>
+            <a:r>
+              <a:rPr lang="de-DE" dirty="0" err="1"/>
+              <a:t>summaries</a:t>
+            </a:r>
+            <a:r>
+              <a:rPr lang="de-DE" dirty="0"/>
+              <a:t> </a:t>
+            </a:r>
+            <a:r>
+              <a:rPr lang="de-DE" dirty="0" err="1"/>
+              <a:t>were</a:t>
+            </a:r>
+            <a:r>
+              <a:rPr lang="de-DE" dirty="0"/>
+              <a:t> </a:t>
+            </a:r>
+            <a:r>
+              <a:rPr lang="de-DE" dirty="0" err="1"/>
+              <a:t>evaluated</a:t>
+            </a:r>
+            <a:r>
+              <a:rPr lang="de-DE" dirty="0"/>
+              <a:t> </a:t>
+            </a:r>
+            <a:r>
+              <a:rPr lang="de-DE" dirty="0" err="1"/>
+              <a:t>by</a:t>
+            </a:r>
+            <a:r>
+              <a:rPr lang="de-DE" dirty="0"/>
+              <a:t> at least 4 </a:t>
+            </a:r>
+            <a:r>
+              <a:rPr lang="de-DE" dirty="0" err="1"/>
+              <a:t>raters</a:t>
+            </a:r>
+            <a:endParaRPr lang="de-DE" dirty="0"/>
+          </a:p>
+        </p:txBody>
+      </p:sp>
+      <p:sp>
+        <p:nvSpPr>
+          <p:cNvPr id="5" name="Pfeil: Chevron 4">
+            <a:extLst>
+              <a:ext uri="{FF2B5EF4-FFF2-40B4-BE49-F238E27FC236}">
+                <a16:creationId xmlns:a16="http://schemas.microsoft.com/office/drawing/2014/main" xmlns="" id="{FE16A436-3EBF-406A-A452-2785E92CA870}"/>
+              </a:ext>
+            </a:extLst>
+          </p:cNvPr>
+          <p:cNvSpPr/>
+          <p:nvPr/>
+        </p:nvSpPr>
+        <p:spPr>
+          <a:xfrm>
+            <a:off x="2483343" y="1591446"/>
+            <a:ext cx="2160000" cy="270000"/>
+          </a:xfrm>
+          <a:prstGeom prst="chevron">
+            <a:avLst/>
+          </a:prstGeom>
+          <a:solidFill>
+            <a:schemeClr val="bg1"/>
+          </a:solidFill>
+          <a:ln w="6350">
+            <a:solidFill>
+              <a:schemeClr val="bg1">
+                <a:lumMod val="65000"/>
+              </a:schemeClr>
+            </a:solidFill>
+          </a:ln>
+        </p:spPr>
+        <p:style>
+          <a:lnRef idx="2">
+            <a:schemeClr val="accent1">
+              <a:shade val="50000"/>
+            </a:schemeClr>
+          </a:lnRef>
+          <a:fillRef idx="1">
+            <a:schemeClr val="accent1"/>
+          </a:fillRef>
+          <a:effectRef idx="0">
+            <a:schemeClr val="accent1"/>
+          </a:effectRef>
+          <a:fontRef idx="minor">
+            <a:schemeClr val="lt1"/>
+          </a:fontRef>
+        </p:style>
+        <p:txBody>
+          <a:bodyPr rot="0" spcFirstLastPara="0" vertOverflow="overflow" horzOverflow="overflow" vert="horz" wrap="square" lIns="91440" tIns="45720" rIns="91440" bIns="45720" numCol="1" spcCol="0" rtlCol="0" fromWordArt="0" anchor="ctr" anchorCtr="0" forceAA="0" compatLnSpc="1">
+            <a:prstTxWarp prst="textNoShape">
+              <a:avLst/>
+            </a:prstTxWarp>
+            <a:noAutofit/>
+          </a:bodyPr>
+          <a:lstStyle/>
+          <a:p>
+            <a:pPr algn="ctr"/>
+            <a:r>
+              <a:rPr lang="de-DE" sz="1400" dirty="0">
+                <a:solidFill>
+                  <a:schemeClr val="bg1">
+                    <a:lumMod val="65000"/>
+                  </a:schemeClr>
+                </a:solidFill>
+              </a:rPr>
+              <a:t>Task</a:t>
+            </a:r>
+          </a:p>
+        </p:txBody>
+      </p:sp>
+      <p:sp>
+        <p:nvSpPr>
+          <p:cNvPr id="6" name="Pfeil: Chevron 5">
+            <a:extLst>
+              <a:ext uri="{FF2B5EF4-FFF2-40B4-BE49-F238E27FC236}">
+                <a16:creationId xmlns:a16="http://schemas.microsoft.com/office/drawing/2014/main" xmlns="" id="{4B425B4C-53B0-4FDA-90C8-3EAE519EFFB2}"/>
+              </a:ext>
+            </a:extLst>
+          </p:cNvPr>
+          <p:cNvSpPr/>
+          <p:nvPr/>
         </p:nvSpPr>
         <p:spPr>
           <a:xfrm>
@@ -4570,12 +6949,12 @@
           <p:cNvPr id="7" name="Pfeil: Chevron 6">
             <a:extLst>
               <a:ext uri="{FF2B5EF4-FFF2-40B4-BE49-F238E27FC236}">
-                <a16:creationId xmlns:a16="http://schemas.microsoft.com/office/drawing/2014/main" id="{14F5353B-3EA0-4F48-A473-08D522F34D71}"/>
+                <a16:creationId xmlns:a16="http://schemas.microsoft.com/office/drawing/2014/main" xmlns="" id="{14F5353B-3EA0-4F48-A473-08D522F34D71}"/>
               </a:ext>
             </a:extLst>
           </p:cNvPr>
           <p:cNvSpPr/>
-          <p:nvPr userDrawn="1"/>
+          <p:nvPr/>
         </p:nvSpPr>
         <p:spPr>
           <a:xfrm>
@@ -4641,12 +7020,12 @@
           <p:cNvPr id="8" name="Pfeil: Chevron 7">
             <a:extLst>
               <a:ext uri="{FF2B5EF4-FFF2-40B4-BE49-F238E27FC236}">
-                <a16:creationId xmlns:a16="http://schemas.microsoft.com/office/drawing/2014/main" id="{655E865C-680E-47F4-9F87-B4EB179E321D}"/>
+                <a16:creationId xmlns:a16="http://schemas.microsoft.com/office/drawing/2014/main" xmlns="" id="{655E865C-680E-47F4-9F87-B4EB179E321D}"/>
               </a:ext>
             </a:extLst>
           </p:cNvPr>
           <p:cNvSpPr/>
-          <p:nvPr userDrawn="1"/>
+          <p:nvPr/>
         </p:nvSpPr>
         <p:spPr>
           <a:xfrm>
@@ -4709,7 +7088,7 @@
     </p:spTree>
     <p:extLst>
       <p:ext uri="{BB962C8B-B14F-4D97-AF65-F5344CB8AC3E}">
-        <p14:creationId xmlns:p14="http://schemas.microsoft.com/office/powerpoint/2010/main" val="1367615360"/>
+        <p14:creationId xmlns:p14="http://schemas.microsoft.com/office/powerpoint/2010/main" xmlns="" val="1367615360"/>
       </p:ext>
     </p:extLst>
   </p:cSld>
@@ -4719,7 +7098,7 @@
 </p:sld>
 </file>
 
-<file path=ppt/slides/slide13.xml><?xml version="1.0" encoding="utf-8"?>
+<file path=ppt/slides/slide18.xml><?xml version="1.0" encoding="utf-8"?>
 <p:sld xmlns:a="http://schemas.openxmlformats.org/drawingml/2006/main" xmlns:r="http://schemas.openxmlformats.org/officeDocument/2006/relationships" xmlns:p="http://schemas.openxmlformats.org/presentationml/2006/main">
   <p:cSld>
     <p:spTree>
@@ -4741,7 +7120,7 @@
           <p:cNvPr id="2" name="Titel 1">
             <a:extLst>
               <a:ext uri="{FF2B5EF4-FFF2-40B4-BE49-F238E27FC236}">
-                <a16:creationId xmlns:a16="http://schemas.microsoft.com/office/drawing/2014/main" id="{ECD13983-53CB-41A8-9897-E4D20881F929}"/>
+                <a16:creationId xmlns:a16="http://schemas.microsoft.com/office/drawing/2014/main" xmlns="" id="{ECD13983-53CB-41A8-9897-E4D20881F929}"/>
               </a:ext>
             </a:extLst>
           </p:cNvPr>
@@ -4802,7 +7181,7 @@
           <p:cNvPr id="3" name="Textplatzhalter 2">
             <a:extLst>
               <a:ext uri="{FF2B5EF4-FFF2-40B4-BE49-F238E27FC236}">
-                <a16:creationId xmlns:a16="http://schemas.microsoft.com/office/drawing/2014/main" id="{8A82E612-E974-4DE0-823F-A661C5C288BB}"/>
+                <a16:creationId xmlns:a16="http://schemas.microsoft.com/office/drawing/2014/main" xmlns="" id="{8A82E612-E974-4DE0-823F-A661C5C288BB}"/>
               </a:ext>
             </a:extLst>
           </p:cNvPr>
@@ -4825,7 +7204,7 @@
     </p:spTree>
     <p:extLst>
       <p:ext uri="{BB962C8B-B14F-4D97-AF65-F5344CB8AC3E}">
-        <p14:creationId xmlns:p14="http://schemas.microsoft.com/office/powerpoint/2010/main" val="1076095784"/>
+        <p14:creationId xmlns:p14="http://schemas.microsoft.com/office/powerpoint/2010/main" xmlns="" val="1076095784"/>
       </p:ext>
     </p:extLst>
   </p:cSld>
@@ -4857,7 +7236,7 @@
           <p:cNvPr id="2" name="Titel 1">
             <a:extLst>
               <a:ext uri="{FF2B5EF4-FFF2-40B4-BE49-F238E27FC236}">
-                <a16:creationId xmlns:a16="http://schemas.microsoft.com/office/drawing/2014/main" id="{D209E4DA-0ABD-4811-9B3D-451135F8BF59}"/>
+                <a16:creationId xmlns:a16="http://schemas.microsoft.com/office/drawing/2014/main" xmlns="" id="{D209E4DA-0ABD-4811-9B3D-451135F8BF59}"/>
               </a:ext>
             </a:extLst>
           </p:cNvPr>
@@ -4885,7 +7264,7 @@
           <p:cNvPr id="3" name="Inhaltsplatzhalter 2">
             <a:extLst>
               <a:ext uri="{FF2B5EF4-FFF2-40B4-BE49-F238E27FC236}">
-                <a16:creationId xmlns:a16="http://schemas.microsoft.com/office/drawing/2014/main" id="{70201C4E-97C9-45D8-ABE0-F9473FAAE5FC}"/>
+                <a16:creationId xmlns:a16="http://schemas.microsoft.com/office/drawing/2014/main" xmlns="" id="{70201C4E-97C9-45D8-ABE0-F9473FAAE5FC}"/>
               </a:ext>
             </a:extLst>
           </p:cNvPr>
@@ -4981,7 +7360,7 @@
           <p:cNvPr id="4" name="Stern: 5 Zacken 3">
             <a:extLst>
               <a:ext uri="{FF2B5EF4-FFF2-40B4-BE49-F238E27FC236}">
-                <a16:creationId xmlns:a16="http://schemas.microsoft.com/office/drawing/2014/main" id="{DBABFC3A-E1A9-4FC4-AE97-94DBBB5E3AED}"/>
+                <a16:creationId xmlns:a16="http://schemas.microsoft.com/office/drawing/2014/main" xmlns="" id="{DBABFC3A-E1A9-4FC4-AE97-94DBBB5E3AED}"/>
               </a:ext>
             </a:extLst>
           </p:cNvPr>
@@ -5033,13 +7412,20 @@
     </p:spTree>
     <p:extLst>
       <p:ext uri="{BB962C8B-B14F-4D97-AF65-F5344CB8AC3E}">
-        <p14:creationId xmlns:p14="http://schemas.microsoft.com/office/powerpoint/2010/main" val="931636316"/>
+        <p14:creationId xmlns:p14="http://schemas.microsoft.com/office/powerpoint/2010/main" xmlns="" val="931636316"/>
       </p:ext>
     </p:extLst>
   </p:cSld>
   <p:clrMapOvr>
     <a:masterClrMapping/>
   </p:clrMapOvr>
+  <p:timing>
+    <p:tnLst>
+      <p:par>
+        <p:cTn id="1" dur="indefinite" restart="never" nodeType="tmRoot"/>
+      </p:par>
+    </p:tnLst>
+  </p:timing>
 </p:sld>
 </file>
 
@@ -5065,7 +7451,7 @@
           <p:cNvPr id="2" name="Titel 1">
             <a:extLst>
               <a:ext uri="{FF2B5EF4-FFF2-40B4-BE49-F238E27FC236}">
-                <a16:creationId xmlns:a16="http://schemas.microsoft.com/office/drawing/2014/main" id="{ECD13983-53CB-41A8-9897-E4D20881F929}"/>
+                <a16:creationId xmlns:a16="http://schemas.microsoft.com/office/drawing/2014/main" xmlns="" id="{ECD13983-53CB-41A8-9897-E4D20881F929}"/>
               </a:ext>
             </a:extLst>
           </p:cNvPr>
@@ -5093,7 +7479,7 @@
           <p:cNvPr id="3" name="Textplatzhalter 2">
             <a:extLst>
               <a:ext uri="{FF2B5EF4-FFF2-40B4-BE49-F238E27FC236}">
-                <a16:creationId xmlns:a16="http://schemas.microsoft.com/office/drawing/2014/main" id="{8A82E612-E974-4DE0-823F-A661C5C288BB}"/>
+                <a16:creationId xmlns:a16="http://schemas.microsoft.com/office/drawing/2014/main" xmlns="" id="{8A82E612-E974-4DE0-823F-A661C5C288BB}"/>
               </a:ext>
             </a:extLst>
           </p:cNvPr>
@@ -5116,7 +7502,7 @@
     </p:spTree>
     <p:extLst>
       <p:ext uri="{BB962C8B-B14F-4D97-AF65-F5344CB8AC3E}">
-        <p14:creationId xmlns:p14="http://schemas.microsoft.com/office/powerpoint/2010/main" val="2456738491"/>
+        <p14:creationId xmlns:p14="http://schemas.microsoft.com/office/powerpoint/2010/main" xmlns="" val="2456738491"/>
       </p:ext>
     </p:extLst>
   </p:cSld>
@@ -5148,7 +7534,7 @@
           <p:cNvPr id="2" name="Titel 1">
             <a:extLst>
               <a:ext uri="{FF2B5EF4-FFF2-40B4-BE49-F238E27FC236}">
-                <a16:creationId xmlns:a16="http://schemas.microsoft.com/office/drawing/2014/main" id="{594F37A0-8FD9-42A4-A80F-4C479182787E}"/>
+                <a16:creationId xmlns:a16="http://schemas.microsoft.com/office/drawing/2014/main" xmlns="" id="{594F37A0-8FD9-42A4-A80F-4C479182787E}"/>
               </a:ext>
             </a:extLst>
           </p:cNvPr>
@@ -5193,7 +7579,7 @@
           <p:cNvPr id="3" name="Inhaltsplatzhalter 2">
             <a:extLst>
               <a:ext uri="{FF2B5EF4-FFF2-40B4-BE49-F238E27FC236}">
-                <a16:creationId xmlns:a16="http://schemas.microsoft.com/office/drawing/2014/main" id="{B201CE33-F1D7-423B-B373-1D449812B3D5}"/>
+                <a16:creationId xmlns:a16="http://schemas.microsoft.com/office/drawing/2014/main" xmlns="" id="{B201CE33-F1D7-423B-B373-1D449812B3D5}"/>
               </a:ext>
             </a:extLst>
           </p:cNvPr>
@@ -5286,12 +7672,12 @@
           <p:cNvPr id="5" name="Pfeil: Chevron 4">
             <a:extLst>
               <a:ext uri="{FF2B5EF4-FFF2-40B4-BE49-F238E27FC236}">
-                <a16:creationId xmlns:a16="http://schemas.microsoft.com/office/drawing/2014/main" id="{FE16A436-3EBF-406A-A452-2785E92CA870}"/>
+                <a16:creationId xmlns:a16="http://schemas.microsoft.com/office/drawing/2014/main" xmlns="" id="{FE16A436-3EBF-406A-A452-2785E92CA870}"/>
               </a:ext>
             </a:extLst>
           </p:cNvPr>
           <p:cNvSpPr/>
-          <p:nvPr userDrawn="1"/>
+          <p:nvPr/>
         </p:nvSpPr>
         <p:spPr>
           <a:xfrm>
@@ -5351,12 +7737,12 @@
           <p:cNvPr id="6" name="Pfeil: Chevron 5">
             <a:extLst>
               <a:ext uri="{FF2B5EF4-FFF2-40B4-BE49-F238E27FC236}">
-                <a16:creationId xmlns:a16="http://schemas.microsoft.com/office/drawing/2014/main" id="{4B425B4C-53B0-4FDA-90C8-3EAE519EFFB2}"/>
+                <a16:creationId xmlns:a16="http://schemas.microsoft.com/office/drawing/2014/main" xmlns="" id="{4B425B4C-53B0-4FDA-90C8-3EAE519EFFB2}"/>
               </a:ext>
             </a:extLst>
           </p:cNvPr>
           <p:cNvSpPr/>
-          <p:nvPr userDrawn="1"/>
+          <p:nvPr/>
         </p:nvSpPr>
         <p:spPr>
           <a:xfrm>
@@ -5421,12 +7807,12 @@
           <p:cNvPr id="7" name="Pfeil: Chevron 6">
             <a:extLst>
               <a:ext uri="{FF2B5EF4-FFF2-40B4-BE49-F238E27FC236}">
-                <a16:creationId xmlns:a16="http://schemas.microsoft.com/office/drawing/2014/main" id="{14F5353B-3EA0-4F48-A473-08D522F34D71}"/>
+                <a16:creationId xmlns:a16="http://schemas.microsoft.com/office/drawing/2014/main" xmlns="" id="{14F5353B-3EA0-4F48-A473-08D522F34D71}"/>
               </a:ext>
             </a:extLst>
           </p:cNvPr>
           <p:cNvSpPr/>
-          <p:nvPr userDrawn="1"/>
+          <p:nvPr/>
         </p:nvSpPr>
         <p:spPr>
           <a:xfrm>
@@ -5498,12 +7884,12 @@
           <p:cNvPr id="8" name="Pfeil: Chevron 7">
             <a:extLst>
               <a:ext uri="{FF2B5EF4-FFF2-40B4-BE49-F238E27FC236}">
-                <a16:creationId xmlns:a16="http://schemas.microsoft.com/office/drawing/2014/main" id="{655E865C-680E-47F4-9F87-B4EB179E321D}"/>
+                <a16:creationId xmlns:a16="http://schemas.microsoft.com/office/drawing/2014/main" xmlns="" id="{655E865C-680E-47F4-9F87-B4EB179E321D}"/>
               </a:ext>
             </a:extLst>
           </p:cNvPr>
           <p:cNvSpPr/>
-          <p:nvPr userDrawn="1"/>
+          <p:nvPr/>
         </p:nvSpPr>
         <p:spPr>
           <a:xfrm>
@@ -5557,7 +7943,7 @@
     </p:spTree>
     <p:extLst>
       <p:ext uri="{BB962C8B-B14F-4D97-AF65-F5344CB8AC3E}">
-        <p14:creationId xmlns:p14="http://schemas.microsoft.com/office/powerpoint/2010/main" val="262019643"/>
+        <p14:creationId xmlns:p14="http://schemas.microsoft.com/office/powerpoint/2010/main" xmlns="" val="262019643"/>
       </p:ext>
     </p:extLst>
   </p:cSld>
@@ -5589,7 +7975,7 @@
           <p:cNvPr id="2" name="Titel 1">
             <a:extLst>
               <a:ext uri="{FF2B5EF4-FFF2-40B4-BE49-F238E27FC236}">
-                <a16:creationId xmlns:a16="http://schemas.microsoft.com/office/drawing/2014/main" id="{ECD13983-53CB-41A8-9897-E4D20881F929}"/>
+                <a16:creationId xmlns:a16="http://schemas.microsoft.com/office/drawing/2014/main" xmlns="" id="{ECD13983-53CB-41A8-9897-E4D20881F929}"/>
               </a:ext>
             </a:extLst>
           </p:cNvPr>
@@ -5617,7 +8003,7 @@
           <p:cNvPr id="3" name="Textplatzhalter 2">
             <a:extLst>
               <a:ext uri="{FF2B5EF4-FFF2-40B4-BE49-F238E27FC236}">
-                <a16:creationId xmlns:a16="http://schemas.microsoft.com/office/drawing/2014/main" id="{8A82E612-E974-4DE0-823F-A661C5C288BB}"/>
+                <a16:creationId xmlns:a16="http://schemas.microsoft.com/office/drawing/2014/main" xmlns="" id="{8A82E612-E974-4DE0-823F-A661C5C288BB}"/>
               </a:ext>
             </a:extLst>
           </p:cNvPr>
@@ -5640,7 +8026,7 @@
     </p:spTree>
     <p:extLst>
       <p:ext uri="{BB962C8B-B14F-4D97-AF65-F5344CB8AC3E}">
-        <p14:creationId xmlns:p14="http://schemas.microsoft.com/office/powerpoint/2010/main" val="4234700527"/>
+        <p14:creationId xmlns:p14="http://schemas.microsoft.com/office/powerpoint/2010/main" xmlns="" val="4234700527"/>
       </p:ext>
     </p:extLst>
   </p:cSld>
@@ -5672,7 +8058,7 @@
           <p:cNvPr id="2" name="Titel 1">
             <a:extLst>
               <a:ext uri="{FF2B5EF4-FFF2-40B4-BE49-F238E27FC236}">
-                <a16:creationId xmlns:a16="http://schemas.microsoft.com/office/drawing/2014/main" id="{594F37A0-8FD9-42A4-A80F-4C479182787E}"/>
+                <a16:creationId xmlns:a16="http://schemas.microsoft.com/office/drawing/2014/main" xmlns="" id="{594F37A0-8FD9-42A4-A80F-4C479182787E}"/>
               </a:ext>
             </a:extLst>
           </p:cNvPr>
@@ -5709,7 +8095,7 @@
           <p:cNvPr id="3" name="Inhaltsplatzhalter 2">
             <a:extLst>
               <a:ext uri="{FF2B5EF4-FFF2-40B4-BE49-F238E27FC236}">
-                <a16:creationId xmlns:a16="http://schemas.microsoft.com/office/drawing/2014/main" id="{B201CE33-F1D7-423B-B373-1D449812B3D5}"/>
+                <a16:creationId xmlns:a16="http://schemas.microsoft.com/office/drawing/2014/main" xmlns="" id="{B201CE33-F1D7-423B-B373-1D449812B3D5}"/>
               </a:ext>
             </a:extLst>
           </p:cNvPr>
@@ -5805,12 +8191,12 @@
           <p:cNvPr id="5" name="Pfeil: Chevron 4">
             <a:extLst>
               <a:ext uri="{FF2B5EF4-FFF2-40B4-BE49-F238E27FC236}">
-                <a16:creationId xmlns:a16="http://schemas.microsoft.com/office/drawing/2014/main" id="{FE16A436-3EBF-406A-A452-2785E92CA870}"/>
+                <a16:creationId xmlns:a16="http://schemas.microsoft.com/office/drawing/2014/main" xmlns="" id="{FE16A436-3EBF-406A-A452-2785E92CA870}"/>
               </a:ext>
             </a:extLst>
           </p:cNvPr>
           <p:cNvSpPr/>
-          <p:nvPr userDrawn="1"/>
+          <p:nvPr/>
         </p:nvSpPr>
         <p:spPr>
           <a:xfrm>
@@ -5871,12 +8257,12 @@
           <p:cNvPr id="6" name="Pfeil: Chevron 5">
             <a:extLst>
               <a:ext uri="{FF2B5EF4-FFF2-40B4-BE49-F238E27FC236}">
-                <a16:creationId xmlns:a16="http://schemas.microsoft.com/office/drawing/2014/main" id="{4B425B4C-53B0-4FDA-90C8-3EAE519EFFB2}"/>
+                <a16:creationId xmlns:a16="http://schemas.microsoft.com/office/drawing/2014/main" xmlns="" id="{4B425B4C-53B0-4FDA-90C8-3EAE519EFFB2}"/>
               </a:ext>
             </a:extLst>
           </p:cNvPr>
           <p:cNvSpPr/>
-          <p:nvPr userDrawn="1"/>
+          <p:nvPr/>
         </p:nvSpPr>
         <p:spPr>
           <a:xfrm>
@@ -5941,12 +8327,12 @@
           <p:cNvPr id="7" name="Pfeil: Chevron 6">
             <a:extLst>
               <a:ext uri="{FF2B5EF4-FFF2-40B4-BE49-F238E27FC236}">
-                <a16:creationId xmlns:a16="http://schemas.microsoft.com/office/drawing/2014/main" id="{14F5353B-3EA0-4F48-A473-08D522F34D71}"/>
+                <a16:creationId xmlns:a16="http://schemas.microsoft.com/office/drawing/2014/main" xmlns="" id="{14F5353B-3EA0-4F48-A473-08D522F34D71}"/>
               </a:ext>
             </a:extLst>
           </p:cNvPr>
           <p:cNvSpPr/>
-          <p:nvPr userDrawn="1"/>
+          <p:nvPr/>
         </p:nvSpPr>
         <p:spPr>
           <a:xfrm>
@@ -6018,12 +8404,12 @@
           <p:cNvPr id="8" name="Pfeil: Chevron 7">
             <a:extLst>
               <a:ext uri="{FF2B5EF4-FFF2-40B4-BE49-F238E27FC236}">
-                <a16:creationId xmlns:a16="http://schemas.microsoft.com/office/drawing/2014/main" id="{655E865C-680E-47F4-9F87-B4EB179E321D}"/>
+                <a16:creationId xmlns:a16="http://schemas.microsoft.com/office/drawing/2014/main" xmlns="" id="{655E865C-680E-47F4-9F87-B4EB179E321D}"/>
               </a:ext>
             </a:extLst>
           </p:cNvPr>
           <p:cNvSpPr/>
-          <p:nvPr userDrawn="1"/>
+          <p:nvPr/>
         </p:nvSpPr>
         <p:spPr>
           <a:xfrm>
@@ -6086,7 +8472,7 @@
     </p:spTree>
     <p:extLst>
       <p:ext uri="{BB962C8B-B14F-4D97-AF65-F5344CB8AC3E}">
-        <p14:creationId xmlns:p14="http://schemas.microsoft.com/office/powerpoint/2010/main" val="1877143116"/>
+        <p14:creationId xmlns:p14="http://schemas.microsoft.com/office/powerpoint/2010/main" xmlns="" val="1877143116"/>
       </p:ext>
     </p:extLst>
   </p:cSld>
@@ -6118,7 +8504,7 @@
           <p:cNvPr id="2" name="Titel 1">
             <a:extLst>
               <a:ext uri="{FF2B5EF4-FFF2-40B4-BE49-F238E27FC236}">
-                <a16:creationId xmlns:a16="http://schemas.microsoft.com/office/drawing/2014/main" id="{ECD13983-53CB-41A8-9897-E4D20881F929}"/>
+                <a16:creationId xmlns:a16="http://schemas.microsoft.com/office/drawing/2014/main" xmlns="" id="{ECD13983-53CB-41A8-9897-E4D20881F929}"/>
               </a:ext>
             </a:extLst>
           </p:cNvPr>
@@ -6146,7 +8532,7 @@
           <p:cNvPr id="3" name="Textplatzhalter 2">
             <a:extLst>
               <a:ext uri="{FF2B5EF4-FFF2-40B4-BE49-F238E27FC236}">
-                <a16:creationId xmlns:a16="http://schemas.microsoft.com/office/drawing/2014/main" id="{8A82E612-E974-4DE0-823F-A661C5C288BB}"/>
+                <a16:creationId xmlns:a16="http://schemas.microsoft.com/office/drawing/2014/main" xmlns="" id="{8A82E612-E974-4DE0-823F-A661C5C288BB}"/>
               </a:ext>
             </a:extLst>
           </p:cNvPr>
@@ -6169,7 +8555,7 @@
     </p:spTree>
     <p:extLst>
       <p:ext uri="{BB962C8B-B14F-4D97-AF65-F5344CB8AC3E}">
-        <p14:creationId xmlns:p14="http://schemas.microsoft.com/office/powerpoint/2010/main" val="3628469136"/>
+        <p14:creationId xmlns:p14="http://schemas.microsoft.com/office/powerpoint/2010/main" xmlns="" val="3628469136"/>
       </p:ext>
     </p:extLst>
   </p:cSld>
@@ -6201,7 +8587,7 @@
           <p:cNvPr id="2" name="Titel 1">
             <a:extLst>
               <a:ext uri="{FF2B5EF4-FFF2-40B4-BE49-F238E27FC236}">
-                <a16:creationId xmlns:a16="http://schemas.microsoft.com/office/drawing/2014/main" id="{594F37A0-8FD9-42A4-A80F-4C479182787E}"/>
+                <a16:creationId xmlns:a16="http://schemas.microsoft.com/office/drawing/2014/main" xmlns="" id="{594F37A0-8FD9-42A4-A80F-4C479182787E}"/>
               </a:ext>
             </a:extLst>
           </p:cNvPr>
@@ -6233,7 +8619,7 @@
           <p:cNvPr id="3" name="Inhaltsplatzhalter 2">
             <a:extLst>
               <a:ext uri="{FF2B5EF4-FFF2-40B4-BE49-F238E27FC236}">
-                <a16:creationId xmlns:a16="http://schemas.microsoft.com/office/drawing/2014/main" id="{B201CE33-F1D7-423B-B373-1D449812B3D5}"/>
+                <a16:creationId xmlns:a16="http://schemas.microsoft.com/office/drawing/2014/main" xmlns="" id="{B201CE33-F1D7-423B-B373-1D449812B3D5}"/>
               </a:ext>
             </a:extLst>
           </p:cNvPr>
@@ -6270,12 +8656,12 @@
           <p:cNvPr id="5" name="Pfeil: Chevron 4">
             <a:extLst>
               <a:ext uri="{FF2B5EF4-FFF2-40B4-BE49-F238E27FC236}">
-                <a16:creationId xmlns:a16="http://schemas.microsoft.com/office/drawing/2014/main" id="{FE16A436-3EBF-406A-A452-2785E92CA870}"/>
+                <a16:creationId xmlns:a16="http://schemas.microsoft.com/office/drawing/2014/main" xmlns="" id="{FE16A436-3EBF-406A-A452-2785E92CA870}"/>
               </a:ext>
             </a:extLst>
           </p:cNvPr>
           <p:cNvSpPr/>
-          <p:nvPr userDrawn="1"/>
+          <p:nvPr/>
         </p:nvSpPr>
         <p:spPr>
           <a:xfrm>
@@ -6340,12 +8726,12 @@
           <p:cNvPr id="6" name="Pfeil: Chevron 5">
             <a:extLst>
               <a:ext uri="{FF2B5EF4-FFF2-40B4-BE49-F238E27FC236}">
-                <a16:creationId xmlns:a16="http://schemas.microsoft.com/office/drawing/2014/main" id="{4B425B4C-53B0-4FDA-90C8-3EAE519EFFB2}"/>
+                <a16:creationId xmlns:a16="http://schemas.microsoft.com/office/drawing/2014/main" xmlns="" id="{4B425B4C-53B0-4FDA-90C8-3EAE519EFFB2}"/>
               </a:ext>
             </a:extLst>
           </p:cNvPr>
           <p:cNvSpPr/>
-          <p:nvPr userDrawn="1"/>
+          <p:nvPr/>
         </p:nvSpPr>
         <p:spPr>
           <a:xfrm>
@@ -6406,12 +8792,12 @@
           <p:cNvPr id="7" name="Pfeil: Chevron 6">
             <a:extLst>
               <a:ext uri="{FF2B5EF4-FFF2-40B4-BE49-F238E27FC236}">
-                <a16:creationId xmlns:a16="http://schemas.microsoft.com/office/drawing/2014/main" id="{14F5353B-3EA0-4F48-A473-08D522F34D71}"/>
+                <a16:creationId xmlns:a16="http://schemas.microsoft.com/office/drawing/2014/main" xmlns="" id="{14F5353B-3EA0-4F48-A473-08D522F34D71}"/>
               </a:ext>
             </a:extLst>
           </p:cNvPr>
           <p:cNvSpPr/>
-          <p:nvPr userDrawn="1"/>
+          <p:nvPr/>
         </p:nvSpPr>
         <p:spPr>
           <a:xfrm>
@@ -6483,12 +8869,12 @@
           <p:cNvPr id="8" name="Pfeil: Chevron 7">
             <a:extLst>
               <a:ext uri="{FF2B5EF4-FFF2-40B4-BE49-F238E27FC236}">
-                <a16:creationId xmlns:a16="http://schemas.microsoft.com/office/drawing/2014/main" id="{655E865C-680E-47F4-9F87-B4EB179E321D}"/>
+                <a16:creationId xmlns:a16="http://schemas.microsoft.com/office/drawing/2014/main" xmlns="" id="{655E865C-680E-47F4-9F87-B4EB179E321D}"/>
               </a:ext>
             </a:extLst>
           </p:cNvPr>
           <p:cNvSpPr/>
-          <p:nvPr userDrawn="1"/>
+          <p:nvPr/>
         </p:nvSpPr>
         <p:spPr>
           <a:xfrm>
@@ -6551,7 +8937,7 @@
     </p:spTree>
     <p:extLst>
       <p:ext uri="{BB962C8B-B14F-4D97-AF65-F5344CB8AC3E}">
-        <p14:creationId xmlns:p14="http://schemas.microsoft.com/office/powerpoint/2010/main" val="3975111759"/>
+        <p14:creationId xmlns:p14="http://schemas.microsoft.com/office/powerpoint/2010/main" xmlns="" val="3975111759"/>
       </p:ext>
     </p:extLst>
   </p:cSld>
@@ -6583,7 +8969,7 @@
           <p:cNvPr id="2" name="Titel 1">
             <a:extLst>
               <a:ext uri="{FF2B5EF4-FFF2-40B4-BE49-F238E27FC236}">
-                <a16:creationId xmlns:a16="http://schemas.microsoft.com/office/drawing/2014/main" id="{594F37A0-8FD9-42A4-A80F-4C479182787E}"/>
+                <a16:creationId xmlns:a16="http://schemas.microsoft.com/office/drawing/2014/main" xmlns="" id="{594F37A0-8FD9-42A4-A80F-4C479182787E}"/>
               </a:ext>
             </a:extLst>
           </p:cNvPr>
@@ -6615,7 +9001,7 @@
           <p:cNvPr id="3" name="Inhaltsplatzhalter 2">
             <a:extLst>
               <a:ext uri="{FF2B5EF4-FFF2-40B4-BE49-F238E27FC236}">
-                <a16:creationId xmlns:a16="http://schemas.microsoft.com/office/drawing/2014/main" id="{B201CE33-F1D7-423B-B373-1D449812B3D5}"/>
+                <a16:creationId xmlns:a16="http://schemas.microsoft.com/office/drawing/2014/main" xmlns="" id="{B201CE33-F1D7-423B-B373-1D449812B3D5}"/>
               </a:ext>
             </a:extLst>
           </p:cNvPr>
@@ -6652,12 +9038,12 @@
           <p:cNvPr id="5" name="Pfeil: Chevron 4">
             <a:extLst>
               <a:ext uri="{FF2B5EF4-FFF2-40B4-BE49-F238E27FC236}">
-                <a16:creationId xmlns:a16="http://schemas.microsoft.com/office/drawing/2014/main" id="{FE16A436-3EBF-406A-A452-2785E92CA870}"/>
+                <a16:creationId xmlns:a16="http://schemas.microsoft.com/office/drawing/2014/main" xmlns="" id="{FE16A436-3EBF-406A-A452-2785E92CA870}"/>
               </a:ext>
             </a:extLst>
           </p:cNvPr>
           <p:cNvSpPr/>
-          <p:nvPr userDrawn="1"/>
+          <p:nvPr/>
         </p:nvSpPr>
         <p:spPr>
           <a:xfrm>
@@ -6722,12 +9108,12 @@
           <p:cNvPr id="6" name="Pfeil: Chevron 5">
             <a:extLst>
               <a:ext uri="{FF2B5EF4-FFF2-40B4-BE49-F238E27FC236}">
-                <a16:creationId xmlns:a16="http://schemas.microsoft.com/office/drawing/2014/main" id="{4B425B4C-53B0-4FDA-90C8-3EAE519EFFB2}"/>
+                <a16:creationId xmlns:a16="http://schemas.microsoft.com/office/drawing/2014/main" xmlns="" id="{4B425B4C-53B0-4FDA-90C8-3EAE519EFFB2}"/>
               </a:ext>
             </a:extLst>
           </p:cNvPr>
           <p:cNvSpPr/>
-          <p:nvPr userDrawn="1"/>
+          <p:nvPr/>
         </p:nvSpPr>
         <p:spPr>
           <a:xfrm>
@@ -6788,12 +9174,12 @@
           <p:cNvPr id="7" name="Pfeil: Chevron 6">
             <a:extLst>
               <a:ext uri="{FF2B5EF4-FFF2-40B4-BE49-F238E27FC236}">
-                <a16:creationId xmlns:a16="http://schemas.microsoft.com/office/drawing/2014/main" id="{14F5353B-3EA0-4F48-A473-08D522F34D71}"/>
+                <a16:creationId xmlns:a16="http://schemas.microsoft.com/office/drawing/2014/main" xmlns="" id="{14F5353B-3EA0-4F48-A473-08D522F34D71}"/>
               </a:ext>
             </a:extLst>
           </p:cNvPr>
           <p:cNvSpPr/>
-          <p:nvPr userDrawn="1"/>
+          <p:nvPr/>
         </p:nvSpPr>
         <p:spPr>
           <a:xfrm>
@@ -6865,12 +9251,12 @@
           <p:cNvPr id="8" name="Pfeil: Chevron 7">
             <a:extLst>
               <a:ext uri="{FF2B5EF4-FFF2-40B4-BE49-F238E27FC236}">
-                <a16:creationId xmlns:a16="http://schemas.microsoft.com/office/drawing/2014/main" id="{655E865C-680E-47F4-9F87-B4EB179E321D}"/>
+                <a16:creationId xmlns:a16="http://schemas.microsoft.com/office/drawing/2014/main" xmlns="" id="{655E865C-680E-47F4-9F87-B4EB179E321D}"/>
               </a:ext>
             </a:extLst>
           </p:cNvPr>
           <p:cNvSpPr/>
-          <p:nvPr userDrawn="1"/>
+          <p:nvPr/>
         </p:nvSpPr>
         <p:spPr>
           <a:xfrm>
@@ -6933,13 +9319,20 @@
     </p:spTree>
     <p:extLst>
       <p:ext uri="{BB962C8B-B14F-4D97-AF65-F5344CB8AC3E}">
-        <p14:creationId xmlns:p14="http://schemas.microsoft.com/office/powerpoint/2010/main" val="2315418219"/>
+        <p14:creationId xmlns:p14="http://schemas.microsoft.com/office/powerpoint/2010/main" xmlns="" val="2315418219"/>
       </p:ext>
     </p:extLst>
   </p:cSld>
   <p:clrMapOvr>
     <a:masterClrMapping/>
   </p:clrMapOvr>
+  <p:timing>
+    <p:tnLst>
+      <p:par>
+        <p:cTn id="1" dur="indefinite" restart="never" nodeType="tmRoot"/>
+      </p:par>
+    </p:tnLst>
+  </p:timing>
 </p:sld>
 </file>
 

</xml_diff>